<commit_message>
cleanup, refactoring. Still bugs
</commit_message>
<xml_diff>
--- a/Evolution_Architecture.pptx
+++ b/Evolution_Architecture.pptx
@@ -104,6 +104,11 @@
       </a:defRPr>
     </a:lvl9pPr>
   </p:defaultTextStyle>
+  <p:extLst>
+    <p:ext uri="{EFAFB233-063F-42B5-8137-9DF3F51BA10A}">
+      <p15:sldGuideLst xmlns:p15="http://schemas.microsoft.com/office/powerpoint/2012/main"/>
+    </p:ext>
+  </p:extLst>
 </p:presentation>
 </file>
 
@@ -238,9 +243,9 @@
           <a:p>
             <a:fld id="{E9C158C0-7942-4C90-83FA-4FE017085481}" type="datetimeFigureOut">
               <a:rPr lang="de-DE" smtClean="0"/>
-              <a:t>14.07.2018</a:t>
+              <a:t>16.07.2018</a:t>
             </a:fld>
-            <a:endParaRPr lang="de-DE" dirty="0"/>
+            <a:endParaRPr lang="de-DE"/>
           </a:p>
         </p:txBody>
       </p:sp>
@@ -259,7 +264,7 @@
           <a:bodyPr/>
           <a:lstStyle/>
           <a:p>
-            <a:endParaRPr lang="de-DE" dirty="0"/>
+            <a:endParaRPr lang="de-DE"/>
           </a:p>
         </p:txBody>
       </p:sp>
@@ -282,7 +287,7 @@
               <a:rPr lang="de-DE" smtClean="0"/>
               <a:t>‹Nr.›</a:t>
             </a:fld>
-            <a:endParaRPr lang="de-DE" dirty="0"/>
+            <a:endParaRPr lang="de-DE"/>
           </a:p>
         </p:txBody>
       </p:sp>
@@ -408,9 +413,9 @@
           <a:p>
             <a:fld id="{E9C158C0-7942-4C90-83FA-4FE017085481}" type="datetimeFigureOut">
               <a:rPr lang="de-DE" smtClean="0"/>
-              <a:t>14.07.2018</a:t>
+              <a:t>16.07.2018</a:t>
             </a:fld>
-            <a:endParaRPr lang="de-DE" dirty="0"/>
+            <a:endParaRPr lang="de-DE"/>
           </a:p>
         </p:txBody>
       </p:sp>
@@ -429,7 +434,7 @@
           <a:bodyPr/>
           <a:lstStyle/>
           <a:p>
-            <a:endParaRPr lang="de-DE" dirty="0"/>
+            <a:endParaRPr lang="de-DE"/>
           </a:p>
         </p:txBody>
       </p:sp>
@@ -452,7 +457,7 @@
               <a:rPr lang="de-DE" smtClean="0"/>
               <a:t>‹Nr.›</a:t>
             </a:fld>
-            <a:endParaRPr lang="de-DE" dirty="0"/>
+            <a:endParaRPr lang="de-DE"/>
           </a:p>
         </p:txBody>
       </p:sp>
@@ -588,9 +593,9 @@
           <a:p>
             <a:fld id="{E9C158C0-7942-4C90-83FA-4FE017085481}" type="datetimeFigureOut">
               <a:rPr lang="de-DE" smtClean="0"/>
-              <a:t>14.07.2018</a:t>
+              <a:t>16.07.2018</a:t>
             </a:fld>
-            <a:endParaRPr lang="de-DE" dirty="0"/>
+            <a:endParaRPr lang="de-DE"/>
           </a:p>
         </p:txBody>
       </p:sp>
@@ -609,7 +614,7 @@
           <a:bodyPr/>
           <a:lstStyle/>
           <a:p>
-            <a:endParaRPr lang="de-DE" dirty="0"/>
+            <a:endParaRPr lang="de-DE"/>
           </a:p>
         </p:txBody>
       </p:sp>
@@ -632,7 +637,7 @@
               <a:rPr lang="de-DE" smtClean="0"/>
               <a:t>‹Nr.›</a:t>
             </a:fld>
-            <a:endParaRPr lang="de-DE" dirty="0"/>
+            <a:endParaRPr lang="de-DE"/>
           </a:p>
         </p:txBody>
       </p:sp>
@@ -758,9 +763,9 @@
           <a:p>
             <a:fld id="{E9C158C0-7942-4C90-83FA-4FE017085481}" type="datetimeFigureOut">
               <a:rPr lang="de-DE" smtClean="0"/>
-              <a:t>14.07.2018</a:t>
+              <a:t>16.07.2018</a:t>
             </a:fld>
-            <a:endParaRPr lang="de-DE" dirty="0"/>
+            <a:endParaRPr lang="de-DE"/>
           </a:p>
         </p:txBody>
       </p:sp>
@@ -779,7 +784,7 @@
           <a:bodyPr/>
           <a:lstStyle/>
           <a:p>
-            <a:endParaRPr lang="de-DE" dirty="0"/>
+            <a:endParaRPr lang="de-DE"/>
           </a:p>
         </p:txBody>
       </p:sp>
@@ -802,7 +807,7 @@
               <a:rPr lang="de-DE" smtClean="0"/>
               <a:t>‹Nr.›</a:t>
             </a:fld>
-            <a:endParaRPr lang="de-DE" dirty="0"/>
+            <a:endParaRPr lang="de-DE"/>
           </a:p>
         </p:txBody>
       </p:sp>
@@ -1002,9 +1007,9 @@
           <a:p>
             <a:fld id="{E9C158C0-7942-4C90-83FA-4FE017085481}" type="datetimeFigureOut">
               <a:rPr lang="de-DE" smtClean="0"/>
-              <a:t>14.07.2018</a:t>
+              <a:t>16.07.2018</a:t>
             </a:fld>
-            <a:endParaRPr lang="de-DE" dirty="0"/>
+            <a:endParaRPr lang="de-DE"/>
           </a:p>
         </p:txBody>
       </p:sp>
@@ -1023,7 +1028,7 @@
           <a:bodyPr/>
           <a:lstStyle/>
           <a:p>
-            <a:endParaRPr lang="de-DE" dirty="0"/>
+            <a:endParaRPr lang="de-DE"/>
           </a:p>
         </p:txBody>
       </p:sp>
@@ -1046,7 +1051,7 @@
               <a:rPr lang="de-DE" smtClean="0"/>
               <a:t>‹Nr.›</a:t>
             </a:fld>
-            <a:endParaRPr lang="de-DE" dirty="0"/>
+            <a:endParaRPr lang="de-DE"/>
           </a:p>
         </p:txBody>
       </p:sp>
@@ -1234,9 +1239,9 @@
           <a:p>
             <a:fld id="{E9C158C0-7942-4C90-83FA-4FE017085481}" type="datetimeFigureOut">
               <a:rPr lang="de-DE" smtClean="0"/>
-              <a:t>14.07.2018</a:t>
+              <a:t>16.07.2018</a:t>
             </a:fld>
-            <a:endParaRPr lang="de-DE" dirty="0"/>
+            <a:endParaRPr lang="de-DE"/>
           </a:p>
         </p:txBody>
       </p:sp>
@@ -1255,7 +1260,7 @@
           <a:bodyPr/>
           <a:lstStyle/>
           <a:p>
-            <a:endParaRPr lang="de-DE" dirty="0"/>
+            <a:endParaRPr lang="de-DE"/>
           </a:p>
         </p:txBody>
       </p:sp>
@@ -1278,7 +1283,7 @@
               <a:rPr lang="de-DE" smtClean="0"/>
               <a:t>‹Nr.›</a:t>
             </a:fld>
-            <a:endParaRPr lang="de-DE" dirty="0"/>
+            <a:endParaRPr lang="de-DE"/>
           </a:p>
         </p:txBody>
       </p:sp>
@@ -1601,9 +1606,9 @@
           <a:p>
             <a:fld id="{E9C158C0-7942-4C90-83FA-4FE017085481}" type="datetimeFigureOut">
               <a:rPr lang="de-DE" smtClean="0"/>
-              <a:t>14.07.2018</a:t>
+              <a:t>16.07.2018</a:t>
             </a:fld>
-            <a:endParaRPr lang="de-DE" dirty="0"/>
+            <a:endParaRPr lang="de-DE"/>
           </a:p>
         </p:txBody>
       </p:sp>
@@ -1622,7 +1627,7 @@
           <a:bodyPr/>
           <a:lstStyle/>
           <a:p>
-            <a:endParaRPr lang="de-DE" dirty="0"/>
+            <a:endParaRPr lang="de-DE"/>
           </a:p>
         </p:txBody>
       </p:sp>
@@ -1645,7 +1650,7 @@
               <a:rPr lang="de-DE" smtClean="0"/>
               <a:t>‹Nr.›</a:t>
             </a:fld>
-            <a:endParaRPr lang="de-DE" dirty="0"/>
+            <a:endParaRPr lang="de-DE"/>
           </a:p>
         </p:txBody>
       </p:sp>
@@ -1719,9 +1724,9 @@
           <a:p>
             <a:fld id="{E9C158C0-7942-4C90-83FA-4FE017085481}" type="datetimeFigureOut">
               <a:rPr lang="de-DE" smtClean="0"/>
-              <a:t>14.07.2018</a:t>
+              <a:t>16.07.2018</a:t>
             </a:fld>
-            <a:endParaRPr lang="de-DE" dirty="0"/>
+            <a:endParaRPr lang="de-DE"/>
           </a:p>
         </p:txBody>
       </p:sp>
@@ -1740,7 +1745,7 @@
           <a:bodyPr/>
           <a:lstStyle/>
           <a:p>
-            <a:endParaRPr lang="de-DE" dirty="0"/>
+            <a:endParaRPr lang="de-DE"/>
           </a:p>
         </p:txBody>
       </p:sp>
@@ -1763,7 +1768,7 @@
               <a:rPr lang="de-DE" smtClean="0"/>
               <a:t>‹Nr.›</a:t>
             </a:fld>
-            <a:endParaRPr lang="de-DE" dirty="0"/>
+            <a:endParaRPr lang="de-DE"/>
           </a:p>
         </p:txBody>
       </p:sp>
@@ -1814,9 +1819,9 @@
           <a:p>
             <a:fld id="{E9C158C0-7942-4C90-83FA-4FE017085481}" type="datetimeFigureOut">
               <a:rPr lang="de-DE" smtClean="0"/>
-              <a:t>14.07.2018</a:t>
+              <a:t>16.07.2018</a:t>
             </a:fld>
-            <a:endParaRPr lang="de-DE" dirty="0"/>
+            <a:endParaRPr lang="de-DE"/>
           </a:p>
         </p:txBody>
       </p:sp>
@@ -1835,7 +1840,7 @@
           <a:bodyPr/>
           <a:lstStyle/>
           <a:p>
-            <a:endParaRPr lang="de-DE" dirty="0"/>
+            <a:endParaRPr lang="de-DE"/>
           </a:p>
         </p:txBody>
       </p:sp>
@@ -1858,7 +1863,7 @@
               <a:rPr lang="de-DE" smtClean="0"/>
               <a:t>‹Nr.›</a:t>
             </a:fld>
-            <a:endParaRPr lang="de-DE" dirty="0"/>
+            <a:endParaRPr lang="de-DE"/>
           </a:p>
         </p:txBody>
       </p:sp>
@@ -2091,9 +2096,9 @@
           <a:p>
             <a:fld id="{E9C158C0-7942-4C90-83FA-4FE017085481}" type="datetimeFigureOut">
               <a:rPr lang="de-DE" smtClean="0"/>
-              <a:t>14.07.2018</a:t>
+              <a:t>16.07.2018</a:t>
             </a:fld>
-            <a:endParaRPr lang="de-DE" dirty="0"/>
+            <a:endParaRPr lang="de-DE"/>
           </a:p>
         </p:txBody>
       </p:sp>
@@ -2112,7 +2117,7 @@
           <a:bodyPr/>
           <a:lstStyle/>
           <a:p>
-            <a:endParaRPr lang="de-DE" dirty="0"/>
+            <a:endParaRPr lang="de-DE"/>
           </a:p>
         </p:txBody>
       </p:sp>
@@ -2135,7 +2140,7 @@
               <a:rPr lang="de-DE" smtClean="0"/>
               <a:t>‹Nr.›</a:t>
             </a:fld>
-            <a:endParaRPr lang="de-DE" dirty="0"/>
+            <a:endParaRPr lang="de-DE"/>
           </a:p>
         </p:txBody>
       </p:sp>
@@ -2259,10 +2264,10 @@
           </a:lstStyle>
           <a:p>
             <a:r>
-              <a:rPr lang="de-DE" dirty="0"/>
+              <a:rPr lang="de-DE"/>
               <a:t>Bild durch Klicken auf Symbol hinzufügen</a:t>
             </a:r>
-            <a:endParaRPr lang="en-US" dirty="0"/>
+            <a:endParaRPr lang="en-US"/>
           </a:p>
         </p:txBody>
       </p:sp>
@@ -2348,9 +2353,9 @@
           <a:p>
             <a:fld id="{E9C158C0-7942-4C90-83FA-4FE017085481}" type="datetimeFigureOut">
               <a:rPr lang="de-DE" smtClean="0"/>
-              <a:t>14.07.2018</a:t>
+              <a:t>16.07.2018</a:t>
             </a:fld>
-            <a:endParaRPr lang="de-DE" dirty="0"/>
+            <a:endParaRPr lang="de-DE"/>
           </a:p>
         </p:txBody>
       </p:sp>
@@ -2369,7 +2374,7 @@
           <a:bodyPr/>
           <a:lstStyle/>
           <a:p>
-            <a:endParaRPr lang="de-DE" dirty="0"/>
+            <a:endParaRPr lang="de-DE"/>
           </a:p>
         </p:txBody>
       </p:sp>
@@ -2392,7 +2397,7 @@
               <a:rPr lang="de-DE" smtClean="0"/>
               <a:t>‹Nr.›</a:t>
             </a:fld>
-            <a:endParaRPr lang="de-DE" dirty="0"/>
+            <a:endParaRPr lang="de-DE"/>
           </a:p>
         </p:txBody>
       </p:sp>
@@ -2561,9 +2566,9 @@
           <a:p>
             <a:fld id="{E9C158C0-7942-4C90-83FA-4FE017085481}" type="datetimeFigureOut">
               <a:rPr lang="de-DE" smtClean="0"/>
-              <a:t>14.07.2018</a:t>
+              <a:t>16.07.2018</a:t>
             </a:fld>
-            <a:endParaRPr lang="de-DE" dirty="0"/>
+            <a:endParaRPr lang="de-DE"/>
           </a:p>
         </p:txBody>
       </p:sp>
@@ -2600,7 +2605,7 @@
             </a:lvl1pPr>
           </a:lstStyle>
           <a:p>
-            <a:endParaRPr lang="de-DE" dirty="0"/>
+            <a:endParaRPr lang="de-DE"/>
           </a:p>
         </p:txBody>
       </p:sp>
@@ -2641,7 +2646,7 @@
               <a:rPr lang="de-DE" smtClean="0"/>
               <a:t>‹Nr.›</a:t>
             </a:fld>
-            <a:endParaRPr lang="de-DE" dirty="0"/>
+            <a:endParaRPr lang="de-DE"/>
           </a:p>
         </p:txBody>
       </p:sp>
@@ -2980,8 +2985,8 @@
         </p:nvSpPr>
         <p:spPr>
           <a:xfrm>
-            <a:off x="1269998" y="2931283"/>
-            <a:ext cx="3547535" cy="4146873"/>
+            <a:off x="1269998" y="3782291"/>
+            <a:ext cx="3547532" cy="989493"/>
           </a:xfrm>
           <a:prstGeom prst="rect">
             <a:avLst/>
@@ -3010,7 +3015,7 @@
           </a:fontRef>
         </p:style>
         <p:txBody>
-          <a:bodyPr rot="0" spcFirstLastPara="0" vertOverflow="overflow" horzOverflow="overflow" vert="horz" wrap="square" lIns="41791" tIns="20896" rIns="41791" bIns="20896" numCol="1" spcCol="0" rtlCol="0" fromWordArt="0" anchor="ctr" anchorCtr="0" forceAA="0" compatLnSpc="1">
+          <a:bodyPr rot="0" spcFirstLastPara="0" vertOverflow="overflow" horzOverflow="overflow" vert="horz" wrap="square" lIns="41791" tIns="20896" rIns="41791" bIns="20896" numCol="1" spcCol="0" rtlCol="0" fromWordArt="0" anchor="t" anchorCtr="0" forceAA="0" compatLnSpc="1">
             <a:prstTxWarp prst="textNoShape">
               <a:avLst/>
             </a:prstTxWarp>
@@ -3018,8 +3023,19 @@
           </a:bodyPr>
           <a:lstStyle/>
           <a:p>
-            <a:pPr algn="ctr"/>
-            <a:endParaRPr lang="de-DE" sz="823" dirty="0"/>
+            <a:r>
+              <a:rPr lang="de-DE" sz="1200" err="1">
+                <a:solidFill>
+                  <a:schemeClr val="tx1"/>
+                </a:solidFill>
+              </a:rPr>
+              <a:t>WorkThread</a:t>
+            </a:r>
+            <a:endParaRPr lang="de-DE" sz="1200">
+              <a:solidFill>
+                <a:schemeClr val="tx1"/>
+              </a:solidFill>
+            </a:endParaRPr>
           </a:p>
         </p:txBody>
       </p:sp>
@@ -3037,8 +3053,8 @@
         </p:nvSpPr>
         <p:spPr>
           <a:xfrm>
-            <a:off x="1270001" y="4191000"/>
-            <a:ext cx="2929466" cy="2389226"/>
+            <a:off x="1270001" y="4771784"/>
+            <a:ext cx="3547532" cy="2346140"/>
           </a:xfrm>
           <a:prstGeom prst="rect">
             <a:avLst/>
@@ -3073,7 +3089,7 @@
           <a:lstStyle/>
           <a:p>
             <a:r>
-              <a:rPr lang="de-DE" sz="1200" dirty="0">
+              <a:rPr lang="de-DE" sz="1200">
                 <a:solidFill>
                   <a:schemeClr val="tx1"/>
                 </a:solidFill>
@@ -3097,7 +3113,7 @@
         </p:nvSpPr>
         <p:spPr>
           <a:xfrm>
-            <a:off x="1269998" y="4792132"/>
+            <a:off x="1269998" y="5329830"/>
             <a:ext cx="2159002" cy="1248649"/>
           </a:xfrm>
           <a:prstGeom prst="rect">
@@ -3136,14 +3152,14 @@
           <a:lstStyle/>
           <a:p>
             <a:r>
-              <a:rPr lang="de-DE" sz="1200" dirty="0">
+              <a:rPr lang="de-DE" sz="1200">
                 <a:solidFill>
                   <a:schemeClr val="tx1"/>
                 </a:solidFill>
               </a:rPr>
               <a:t>HISTORY</a:t>
             </a:r>
-            <a:endParaRPr lang="de-DE" sz="1050" dirty="0">
+            <a:endParaRPr lang="de-DE" sz="1050">
               <a:solidFill>
                 <a:schemeClr val="tx1"/>
               </a:solidFill>
@@ -3165,8 +3181,8 @@
         </p:nvSpPr>
         <p:spPr>
           <a:xfrm>
-            <a:off x="549274" y="7110393"/>
-            <a:ext cx="5038724" cy="1891367"/>
+            <a:off x="1269998" y="7110393"/>
+            <a:ext cx="3547532" cy="1891367"/>
           </a:xfrm>
           <a:prstGeom prst="rect">
             <a:avLst/>
@@ -3199,7 +3215,7 @@
           <a:lstStyle/>
           <a:p>
             <a:r>
-              <a:rPr lang="de-DE" sz="1400" dirty="0">
+              <a:rPr lang="de-DE" sz="1400">
                 <a:solidFill>
                   <a:schemeClr val="tx1"/>
                 </a:solidFill>
@@ -3256,7 +3272,7 @@
           <a:lstStyle/>
           <a:p>
             <a:r>
-              <a:rPr lang="de-DE" sz="1400" dirty="0">
+              <a:rPr lang="de-DE" sz="1400">
                 <a:solidFill>
                   <a:schemeClr val="tx1"/>
                 </a:solidFill>
@@ -3312,7 +3328,7 @@
           <a:p>
             <a:pPr algn="ctr"/>
             <a:r>
-              <a:rPr lang="de-DE" dirty="0">
+              <a:rPr lang="de-DE">
                 <a:solidFill>
                   <a:schemeClr val="tx1"/>
                 </a:solidFill>
@@ -3368,7 +3384,7 @@
           <a:p>
             <a:pPr algn="ctr"/>
             <a:r>
-              <a:rPr lang="de-DE" dirty="0">
+              <a:rPr lang="de-DE">
                 <a:solidFill>
                   <a:schemeClr val="tx1"/>
                 </a:solidFill>
@@ -3392,7 +3408,7 @@
         </p:nvSpPr>
         <p:spPr>
           <a:xfrm>
-            <a:off x="6073136" y="2278602"/>
+            <a:off x="6067822" y="2480726"/>
             <a:ext cx="433493" cy="469053"/>
           </a:xfrm>
           <a:prstGeom prst="rect">
@@ -3424,7 +3440,7 @@
           <a:p>
             <a:pPr algn="ctr"/>
             <a:r>
-              <a:rPr lang="de-DE" dirty="0">
+              <a:rPr lang="de-DE">
                 <a:solidFill>
                   <a:schemeClr val="tx1"/>
                 </a:solidFill>
@@ -3448,7 +3464,7 @@
         </p:nvSpPr>
         <p:spPr>
           <a:xfrm>
-            <a:off x="6073136" y="3032878"/>
+            <a:off x="6073133" y="4028429"/>
             <a:ext cx="433493" cy="469053"/>
           </a:xfrm>
           <a:prstGeom prst="rect">
@@ -3480,7 +3496,7 @@
           <a:p>
             <a:pPr algn="ctr"/>
             <a:r>
-              <a:rPr lang="de-DE" dirty="0">
+              <a:rPr lang="de-DE">
                 <a:solidFill>
                   <a:schemeClr val="tx1"/>
                 </a:solidFill>
@@ -3492,10 +3508,10 @@
       </p:sp>
       <p:sp>
         <p:nvSpPr>
-          <p:cNvPr id="16" name="Rechteck 15">
+          <p:cNvPr id="17" name="Rechteck 16">
             <a:extLst>
               <a:ext uri="{FF2B5EF4-FFF2-40B4-BE49-F238E27FC236}">
-                <a16:creationId xmlns:a16="http://schemas.microsoft.com/office/drawing/2014/main" id="{6AEAC290-B45B-43C6-980B-B264CA21CC4C}"/>
+                <a16:creationId xmlns:a16="http://schemas.microsoft.com/office/drawing/2014/main" id="{10A4B270-0BFC-4077-AC65-E2EA5E8B1FE1}"/>
               </a:ext>
             </a:extLst>
           </p:cNvPr>
@@ -3504,7 +3520,7 @@
         </p:nvSpPr>
         <p:spPr>
           <a:xfrm>
-            <a:off x="6073136" y="3624771"/>
+            <a:off x="6073134" y="4805678"/>
             <a:ext cx="433493" cy="469053"/>
           </a:xfrm>
           <a:prstGeom prst="rect">
@@ -3536,22 +3552,22 @@
           <a:p>
             <a:pPr algn="ctr"/>
             <a:r>
-              <a:rPr lang="de-DE" dirty="0">
+              <a:rPr lang="de-DE">
                 <a:solidFill>
                   <a:schemeClr val="tx1"/>
                 </a:solidFill>
               </a:rPr>
-              <a:t>5</a:t>
-            </a:r>
-          </a:p>
-        </p:txBody>
-      </p:sp>
-      <p:sp>
-        <p:nvSpPr>
-          <p:cNvPr id="17" name="Rechteck 16">
+              <a:t>4</a:t>
+            </a:r>
+          </a:p>
+        </p:txBody>
+      </p:sp>
+      <p:sp>
+        <p:nvSpPr>
+          <p:cNvPr id="18" name="Rechteck 17">
             <a:extLst>
               <a:ext uri="{FF2B5EF4-FFF2-40B4-BE49-F238E27FC236}">
-                <a16:creationId xmlns:a16="http://schemas.microsoft.com/office/drawing/2014/main" id="{10A4B270-0BFC-4077-AC65-E2EA5E8B1FE1}"/>
+                <a16:creationId xmlns:a16="http://schemas.microsoft.com/office/drawing/2014/main" id="{3E9685A7-9E5F-4869-BB7F-312113EE0006}"/>
               </a:ext>
             </a:extLst>
           </p:cNvPr>
@@ -3560,7 +3576,7 @@
         </p:nvSpPr>
         <p:spPr>
           <a:xfrm>
-            <a:off x="6073136" y="4234086"/>
+            <a:off x="6073135" y="5710327"/>
             <a:ext cx="433493" cy="469053"/>
           </a:xfrm>
           <a:prstGeom prst="rect">
@@ -3592,22 +3608,22 @@
           <a:p>
             <a:pPr algn="ctr"/>
             <a:r>
-              <a:rPr lang="de-DE" dirty="0">
+              <a:rPr lang="de-DE">
                 <a:solidFill>
                   <a:schemeClr val="tx1"/>
                 </a:solidFill>
               </a:rPr>
-              <a:t>4</a:t>
-            </a:r>
-          </a:p>
-        </p:txBody>
-      </p:sp>
-      <p:sp>
-        <p:nvSpPr>
-          <p:cNvPr id="18" name="Rechteck 17">
+              <a:t>3</a:t>
+            </a:r>
+          </a:p>
+        </p:txBody>
+      </p:sp>
+      <p:sp>
+        <p:nvSpPr>
+          <p:cNvPr id="19" name="Rechteck 18">
             <a:extLst>
               <a:ext uri="{FF2B5EF4-FFF2-40B4-BE49-F238E27FC236}">
-                <a16:creationId xmlns:a16="http://schemas.microsoft.com/office/drawing/2014/main" id="{3E9685A7-9E5F-4869-BB7F-312113EE0006}"/>
+                <a16:creationId xmlns:a16="http://schemas.microsoft.com/office/drawing/2014/main" id="{D7F2DEE7-5A8E-4DC1-A163-060D82902670}"/>
               </a:ext>
             </a:extLst>
           </p:cNvPr>
@@ -3616,7 +3632,7 @@
         </p:nvSpPr>
         <p:spPr>
           <a:xfrm>
-            <a:off x="6073136" y="5263519"/>
+            <a:off x="6073136" y="6578479"/>
             <a:ext cx="433493" cy="469053"/>
           </a:xfrm>
           <a:prstGeom prst="rect">
@@ -3648,124 +3664,12 @@
           <a:p>
             <a:pPr algn="ctr"/>
             <a:r>
-              <a:rPr lang="de-DE" dirty="0">
-                <a:solidFill>
-                  <a:schemeClr val="tx1"/>
-                </a:solidFill>
-              </a:rPr>
-              <a:t>3</a:t>
-            </a:r>
-          </a:p>
-        </p:txBody>
-      </p:sp>
-      <p:sp>
-        <p:nvSpPr>
-          <p:cNvPr id="19" name="Rechteck 18">
-            <a:extLst>
-              <a:ext uri="{FF2B5EF4-FFF2-40B4-BE49-F238E27FC236}">
-                <a16:creationId xmlns:a16="http://schemas.microsoft.com/office/drawing/2014/main" id="{D7F2DEE7-5A8E-4DC1-A163-060D82902670}"/>
-              </a:ext>
-            </a:extLst>
-          </p:cNvPr>
-          <p:cNvSpPr/>
-          <p:nvPr/>
-        </p:nvSpPr>
-        <p:spPr>
-          <a:xfrm>
-            <a:off x="6073136" y="6034971"/>
-            <a:ext cx="433493" cy="469053"/>
-          </a:xfrm>
-          <a:prstGeom prst="rect">
-            <a:avLst/>
-          </a:prstGeom>
-          <a:solidFill>
-            <a:schemeClr val="bg1"/>
-          </a:solidFill>
-        </p:spPr>
-        <p:style>
-          <a:lnRef idx="2">
-            <a:schemeClr val="accent1">
-              <a:shade val="50000"/>
-            </a:schemeClr>
-          </a:lnRef>
-          <a:fillRef idx="1">
-            <a:schemeClr val="accent1"/>
-          </a:fillRef>
-          <a:effectRef idx="0">
-            <a:schemeClr val="accent1"/>
-          </a:effectRef>
-          <a:fontRef idx="minor">
-            <a:schemeClr val="lt1"/>
-          </a:fontRef>
-        </p:style>
-        <p:txBody>
-          <a:bodyPr rtlCol="0" anchor="ctr"/>
-          <a:lstStyle/>
-          <a:p>
-            <a:pPr algn="ctr"/>
-            <a:r>
-              <a:rPr lang="de-DE" dirty="0">
+              <a:rPr lang="de-DE">
                 <a:solidFill>
                   <a:schemeClr val="tx1"/>
                 </a:solidFill>
               </a:rPr>
               <a:t>2</a:t>
-            </a:r>
-          </a:p>
-        </p:txBody>
-      </p:sp>
-      <p:sp>
-        <p:nvSpPr>
-          <p:cNvPr id="20" name="Rechteck 19">
-            <a:extLst>
-              <a:ext uri="{FF2B5EF4-FFF2-40B4-BE49-F238E27FC236}">
-                <a16:creationId xmlns:a16="http://schemas.microsoft.com/office/drawing/2014/main" id="{6B6CD7A9-56EE-42A6-A87E-23710CAB4A58}"/>
-              </a:ext>
-            </a:extLst>
-          </p:cNvPr>
-          <p:cNvSpPr/>
-          <p:nvPr/>
-        </p:nvSpPr>
-        <p:spPr>
-          <a:xfrm>
-            <a:off x="6073136" y="6595479"/>
-            <a:ext cx="433493" cy="469053"/>
-          </a:xfrm>
-          <a:prstGeom prst="rect">
-            <a:avLst/>
-          </a:prstGeom>
-          <a:solidFill>
-            <a:schemeClr val="bg1"/>
-          </a:solidFill>
-        </p:spPr>
-        <p:style>
-          <a:lnRef idx="2">
-            <a:schemeClr val="accent1">
-              <a:shade val="50000"/>
-            </a:schemeClr>
-          </a:lnRef>
-          <a:fillRef idx="1">
-            <a:schemeClr val="accent1"/>
-          </a:fillRef>
-          <a:effectRef idx="0">
-            <a:schemeClr val="accent1"/>
-          </a:effectRef>
-          <a:fontRef idx="minor">
-            <a:schemeClr val="lt1"/>
-          </a:fontRef>
-        </p:style>
-        <p:txBody>
-          <a:bodyPr rtlCol="0" anchor="ctr"/>
-          <a:lstStyle/>
-          <a:p>
-            <a:pPr algn="ctr"/>
-            <a:r>
-              <a:rPr lang="de-DE" dirty="0">
-                <a:solidFill>
-                  <a:schemeClr val="tx1"/>
-                </a:solidFill>
-              </a:rPr>
-              <a:t>1</a:t>
             </a:r>
           </a:p>
         </p:txBody>
@@ -3816,13 +3720,243 @@
           <a:p>
             <a:pPr algn="ctr"/>
             <a:r>
-              <a:rPr lang="de-DE" dirty="0">
+              <a:rPr lang="de-DE">
                 <a:solidFill>
                   <a:schemeClr val="tx1"/>
                 </a:solidFill>
               </a:rPr>
               <a:t>0</a:t>
             </a:r>
+          </a:p>
+        </p:txBody>
+      </p:sp>
+      <p:sp>
+        <p:nvSpPr>
+          <p:cNvPr id="2" name="Rechteck 1">
+            <a:extLst>
+              <a:ext uri="{FF2B5EF4-FFF2-40B4-BE49-F238E27FC236}">
+                <a16:creationId xmlns:a16="http://schemas.microsoft.com/office/drawing/2014/main" id="{1354B24B-035F-48DA-8C02-E2445A3DBD23}"/>
+              </a:ext>
+            </a:extLst>
+          </p:cNvPr>
+          <p:cNvSpPr/>
+          <p:nvPr/>
+        </p:nvSpPr>
+        <p:spPr>
+          <a:xfrm>
+            <a:off x="549276" y="3269673"/>
+            <a:ext cx="5038723" cy="5996247"/>
+          </a:xfrm>
+          <a:prstGeom prst="rect">
+            <a:avLst/>
+          </a:prstGeom>
+          <a:noFill/>
+          <a:ln w="57150">
+            <a:solidFill>
+              <a:srgbClr val="C00000"/>
+            </a:solidFill>
+          </a:ln>
+        </p:spPr>
+        <p:style>
+          <a:lnRef idx="2">
+            <a:schemeClr val="accent1">
+              <a:shade val="50000"/>
+            </a:schemeClr>
+          </a:lnRef>
+          <a:fillRef idx="1">
+            <a:schemeClr val="accent1"/>
+          </a:fillRef>
+          <a:effectRef idx="0">
+            <a:schemeClr val="accent1"/>
+          </a:effectRef>
+          <a:fontRef idx="minor">
+            <a:schemeClr val="lt1"/>
+          </a:fontRef>
+        </p:style>
+        <p:txBody>
+          <a:bodyPr rtlCol="0" anchor="t"/>
+          <a:lstStyle/>
+          <a:p>
+            <a:r>
+              <a:rPr lang="de-DE" err="1">
+                <a:solidFill>
+                  <a:srgbClr val="C00000"/>
+                </a:solidFill>
+              </a:rPr>
+              <a:t>work</a:t>
+            </a:r>
+            <a:r>
+              <a:rPr lang="de-DE">
+                <a:solidFill>
+                  <a:srgbClr val="C00000"/>
+                </a:solidFill>
+              </a:rPr>
+              <a:t> </a:t>
+            </a:r>
+            <a:r>
+              <a:rPr lang="de-DE" err="1">
+                <a:solidFill>
+                  <a:srgbClr val="C00000"/>
+                </a:solidFill>
+              </a:rPr>
+              <a:t>thread</a:t>
+            </a:r>
+            <a:endParaRPr lang="de-DE">
+              <a:solidFill>
+                <a:srgbClr val="C00000"/>
+              </a:solidFill>
+            </a:endParaRPr>
+          </a:p>
+        </p:txBody>
+      </p:sp>
+      <p:sp>
+        <p:nvSpPr>
+          <p:cNvPr id="3" name="Rechteck 2">
+            <a:extLst>
+              <a:ext uri="{FF2B5EF4-FFF2-40B4-BE49-F238E27FC236}">
+                <a16:creationId xmlns:a16="http://schemas.microsoft.com/office/drawing/2014/main" id="{347D3B46-A32F-4191-A4E1-D57A465E807C}"/>
+              </a:ext>
+            </a:extLst>
+          </p:cNvPr>
+          <p:cNvSpPr/>
+          <p:nvPr/>
+        </p:nvSpPr>
+        <p:spPr>
+          <a:xfrm>
+            <a:off x="549276" y="2299855"/>
+            <a:ext cx="5038723" cy="688407"/>
+          </a:xfrm>
+          <a:prstGeom prst="rect">
+            <a:avLst/>
+          </a:prstGeom>
+          <a:solidFill>
+            <a:schemeClr val="accent2">
+              <a:lumMod val="20000"/>
+              <a:lumOff val="80000"/>
+            </a:schemeClr>
+          </a:solidFill>
+        </p:spPr>
+        <p:style>
+          <a:lnRef idx="2">
+            <a:schemeClr val="accent1">
+              <a:shade val="50000"/>
+            </a:schemeClr>
+          </a:lnRef>
+          <a:fillRef idx="1">
+            <a:schemeClr val="accent1"/>
+          </a:fillRef>
+          <a:effectRef idx="0">
+            <a:schemeClr val="accent1"/>
+          </a:effectRef>
+          <a:fontRef idx="minor">
+            <a:schemeClr val="lt1"/>
+          </a:fontRef>
+        </p:style>
+        <p:txBody>
+          <a:bodyPr rtlCol="0" anchor="t"/>
+          <a:lstStyle/>
+          <a:p>
+            <a:r>
+              <a:rPr lang="de-DE" sz="1200" err="1">
+                <a:solidFill>
+                  <a:schemeClr val="tx1"/>
+                </a:solidFill>
+              </a:rPr>
+              <a:t>WorkThreadInterface</a:t>
+            </a:r>
+            <a:endParaRPr lang="de-DE" sz="1200">
+              <a:solidFill>
+                <a:schemeClr val="tx1"/>
+              </a:solidFill>
+            </a:endParaRPr>
+          </a:p>
+        </p:txBody>
+      </p:sp>
+      <p:pic>
+        <p:nvPicPr>
+          <p:cNvPr id="7" name="Grafik 6" descr="Wiederholung">
+            <a:extLst>
+              <a:ext uri="{FF2B5EF4-FFF2-40B4-BE49-F238E27FC236}">
+                <a16:creationId xmlns:a16="http://schemas.microsoft.com/office/drawing/2014/main" id="{0FF3122E-0C6D-44A4-9DBD-652E64B41090}"/>
+              </a:ext>
+            </a:extLst>
+          </p:cNvPr>
+          <p:cNvPicPr>
+            <a:picLocks noChangeAspect="1"/>
+          </p:cNvPicPr>
+          <p:nvPr/>
+        </p:nvPicPr>
+        <p:blipFill>
+          <a:blip r:embed="rId2">
+            <a:extLst>
+              <a:ext uri="{28A0092B-C50C-407E-A947-70E740481C1C}">
+                <a14:useLocalDpi xmlns:a14="http://schemas.microsoft.com/office/drawing/2010/main" val="0"/>
+              </a:ext>
+              <a:ext uri="{96DAC541-7B7A-43D3-8B79-37D633B846F1}">
+                <asvg:svgBlip xmlns:asvg="http://schemas.microsoft.com/office/drawing/2016/SVG/main" r:embed="rId3"/>
+              </a:ext>
+            </a:extLst>
+          </a:blip>
+          <a:stretch>
+            <a:fillRect/>
+          </a:stretch>
+        </p:blipFill>
+        <p:spPr>
+          <a:xfrm>
+            <a:off x="2667000" y="3335027"/>
+            <a:ext cx="630381" cy="447264"/>
+          </a:xfrm>
+          <a:prstGeom prst="rect">
+            <a:avLst/>
+          </a:prstGeom>
+        </p:spPr>
+      </p:pic>
+      <p:sp>
+        <p:nvSpPr>
+          <p:cNvPr id="8" name="Pfeil: nach unten 7">
+            <a:extLst>
+              <a:ext uri="{FF2B5EF4-FFF2-40B4-BE49-F238E27FC236}">
+                <a16:creationId xmlns:a16="http://schemas.microsoft.com/office/drawing/2014/main" id="{99A9D07C-681C-4809-845D-D48B90C7428F}"/>
+              </a:ext>
+            </a:extLst>
+          </p:cNvPr>
+          <p:cNvSpPr/>
+          <p:nvPr/>
+        </p:nvSpPr>
+        <p:spPr>
+          <a:xfrm>
+            <a:off x="2822863" y="3021701"/>
+            <a:ext cx="318654" cy="318654"/>
+          </a:xfrm>
+          <a:prstGeom prst="downArrow">
+            <a:avLst/>
+          </a:prstGeom>
+          <a:solidFill>
+            <a:schemeClr val="tx1"/>
+          </a:solidFill>
+        </p:spPr>
+        <p:style>
+          <a:lnRef idx="2">
+            <a:schemeClr val="accent1">
+              <a:shade val="50000"/>
+            </a:schemeClr>
+          </a:lnRef>
+          <a:fillRef idx="1">
+            <a:schemeClr val="accent1"/>
+          </a:fillRef>
+          <a:effectRef idx="0">
+            <a:schemeClr val="accent1"/>
+          </a:effectRef>
+          <a:fontRef idx="minor">
+            <a:schemeClr val="lt1"/>
+          </a:fontRef>
+        </p:style>
+        <p:txBody>
+          <a:bodyPr rtlCol="0" anchor="ctr"/>
+          <a:lstStyle/>
+          <a:p>
+            <a:pPr algn="ctr"/>
+            <a:endParaRPr lang="de-DE"/>
           </a:p>
         </p:txBody>
       </p:sp>

</xml_diff>

<commit_message>
Bug in GotoGeneration fixed. Rather stable now.
</commit_message>
<xml_diff>
--- a/Evolution_Architecture.pptx
+++ b/Evolution_Architecture.pptx
@@ -3054,7 +3054,7 @@
         <p:spPr>
           <a:xfrm>
             <a:off x="1270001" y="4771784"/>
-            <a:ext cx="3547532" cy="2346140"/>
+            <a:ext cx="3547532" cy="555087"/>
           </a:xfrm>
           <a:prstGeom prst="rect">
             <a:avLst/>
@@ -3094,8 +3094,31 @@
                   <a:schemeClr val="tx1"/>
                 </a:solidFill>
               </a:rPr>
-              <a:t>GLUE</a:t>
-            </a:r>
+              <a:t>GLUE            </a:t>
+            </a:r>
+          </a:p>
+          <a:p>
+            <a:r>
+              <a:rPr lang="de-DE" sz="1200">
+                <a:solidFill>
+                  <a:schemeClr val="tx1"/>
+                </a:solidFill>
+              </a:rPr>
+              <a:t>                                 </a:t>
+            </a:r>
+            <a:r>
+              <a:rPr lang="de-DE" sz="1600">
+                <a:solidFill>
+                  <a:schemeClr val="tx1"/>
+                </a:solidFill>
+              </a:rPr>
+              <a:t>EvoHistorySys</a:t>
+            </a:r>
+            <a:endParaRPr lang="de-DE" sz="1200">
+              <a:solidFill>
+                <a:schemeClr val="tx1"/>
+              </a:solidFill>
+            </a:endParaRPr>
           </a:p>
         </p:txBody>
       </p:sp>
@@ -3113,8 +3136,8 @@
         </p:nvSpPr>
         <p:spPr>
           <a:xfrm>
-            <a:off x="1269998" y="5329830"/>
-            <a:ext cx="2159002" cy="1248649"/>
+            <a:off x="1269997" y="5326872"/>
+            <a:ext cx="3547531" cy="1251608"/>
           </a:xfrm>
           <a:prstGeom prst="rect">
             <a:avLst/>
@@ -3157,13 +3180,55 @@
                   <a:schemeClr val="tx1"/>
                 </a:solidFill>
               </a:rPr>
-              <a:t>HISTORY</a:t>
-            </a:r>
-            <a:endParaRPr lang="de-DE" sz="1050">
+              <a:t>HISTORY              </a:t>
+            </a:r>
+          </a:p>
+          <a:p>
+            <a:r>
+              <a:rPr lang="de-DE" sz="1200">
+                <a:solidFill>
+                  <a:schemeClr val="tx1"/>
+                </a:solidFill>
+              </a:rPr>
+              <a:t>                                 </a:t>
+            </a:r>
+            <a:r>
+              <a:rPr lang="de-DE" sz="1600">
+                <a:solidFill>
+                  <a:schemeClr val="tx1"/>
+                </a:solidFill>
+              </a:rPr>
+              <a:t>HistorySystem</a:t>
+            </a:r>
+            <a:endParaRPr lang="de-DE" sz="1200">
               <a:solidFill>
                 <a:schemeClr val="tx1"/>
               </a:solidFill>
             </a:endParaRPr>
+          </a:p>
+          <a:p>
+            <a:endParaRPr lang="de-DE" sz="1200">
+              <a:solidFill>
+                <a:schemeClr val="tx1"/>
+              </a:solidFill>
+            </a:endParaRPr>
+          </a:p>
+          <a:p>
+            <a:endParaRPr lang="de-DE" sz="1200">
+              <a:solidFill>
+                <a:schemeClr val="tx1"/>
+              </a:solidFill>
+            </a:endParaRPr>
+          </a:p>
+          <a:p>
+            <a:r>
+              <a:rPr lang="de-DE" sz="1600">
+                <a:solidFill>
+                  <a:schemeClr val="tx1"/>
+                </a:solidFill>
+              </a:rPr>
+              <a:t>		ModelData (Interface)</a:t>
+            </a:r>
           </a:p>
         </p:txBody>
       </p:sp>
@@ -3957,6 +4022,89 @@
           <a:p>
             <a:pPr algn="ctr"/>
             <a:endParaRPr lang="de-DE"/>
+          </a:p>
+        </p:txBody>
+      </p:sp>
+      <p:sp>
+        <p:nvSpPr>
+          <p:cNvPr id="22" name="Rechteck 21">
+            <a:extLst>
+              <a:ext uri="{FF2B5EF4-FFF2-40B4-BE49-F238E27FC236}">
+                <a16:creationId xmlns:a16="http://schemas.microsoft.com/office/drawing/2014/main" id="{2DB5B410-CE86-48DA-9DCC-F72681569353}"/>
+              </a:ext>
+            </a:extLst>
+          </p:cNvPr>
+          <p:cNvSpPr/>
+          <p:nvPr/>
+        </p:nvSpPr>
+        <p:spPr>
+          <a:xfrm>
+            <a:off x="1269996" y="6596202"/>
+            <a:ext cx="3547532" cy="555087"/>
+          </a:xfrm>
+          <a:prstGeom prst="rect">
+            <a:avLst/>
+          </a:prstGeom>
+          <a:solidFill>
+            <a:srgbClr val="FFFF00"/>
+          </a:solidFill>
+        </p:spPr>
+        <p:style>
+          <a:lnRef idx="2">
+            <a:schemeClr val="accent1">
+              <a:shade val="50000"/>
+            </a:schemeClr>
+          </a:lnRef>
+          <a:fillRef idx="1">
+            <a:schemeClr val="accent1"/>
+          </a:fillRef>
+          <a:effectRef idx="0">
+            <a:schemeClr val="accent1"/>
+          </a:effectRef>
+          <a:fontRef idx="minor">
+            <a:schemeClr val="lt1"/>
+          </a:fontRef>
+        </p:style>
+        <p:txBody>
+          <a:bodyPr rot="0" spcFirstLastPara="0" vertOverflow="overflow" horzOverflow="overflow" vert="horz" wrap="square" lIns="41791" tIns="20896" rIns="41791" bIns="20896" numCol="1" spcCol="0" rtlCol="0" fromWordArt="0" anchor="t" anchorCtr="0" forceAA="0" compatLnSpc="1">
+            <a:prstTxWarp prst="textNoShape">
+              <a:avLst/>
+            </a:prstTxWarp>
+            <a:noAutofit/>
+          </a:bodyPr>
+          <a:lstStyle/>
+          <a:p>
+            <a:r>
+              <a:rPr lang="de-DE" sz="1200">
+                <a:solidFill>
+                  <a:schemeClr val="tx1"/>
+                </a:solidFill>
+              </a:rPr>
+              <a:t>GLUE</a:t>
+            </a:r>
+          </a:p>
+          <a:p>
+            <a:r>
+              <a:rPr lang="de-DE" sz="1200">
+                <a:solidFill>
+                  <a:schemeClr val="tx1"/>
+                </a:solidFill>
+              </a:rPr>
+              <a:t>                         </a:t>
+            </a:r>
+            <a:r>
+              <a:rPr lang="de-DE" sz="1600">
+                <a:solidFill>
+                  <a:schemeClr val="tx1"/>
+                </a:solidFill>
+              </a:rPr>
+              <a:t>      EvoModelData</a:t>
+            </a:r>
+            <a:endParaRPr lang="de-DE" sz="1200">
+              <a:solidFill>
+                <a:schemeClr val="tx1"/>
+              </a:solidFill>
+            </a:endParaRPr>
           </a:p>
         </p:txBody>
       </p:sp>

</xml_diff>

<commit_message>
Bug in Grid::ImplementPlan fixed. Regression test (Test_4) implemented. All tests running.
</commit_message>
<xml_diff>
--- a/Evolution_Architecture.pptx
+++ b/Evolution_Architecture.pptx
@@ -243,7 +243,7 @@
           <a:p>
             <a:fld id="{E9C158C0-7942-4C90-83FA-4FE017085481}" type="datetimeFigureOut">
               <a:rPr lang="de-DE" smtClean="0"/>
-              <a:t>16.07.2018</a:t>
+              <a:t>17.07.2018</a:t>
             </a:fld>
             <a:endParaRPr lang="de-DE"/>
           </a:p>
@@ -413,7 +413,7 @@
           <a:p>
             <a:fld id="{E9C158C0-7942-4C90-83FA-4FE017085481}" type="datetimeFigureOut">
               <a:rPr lang="de-DE" smtClean="0"/>
-              <a:t>16.07.2018</a:t>
+              <a:t>17.07.2018</a:t>
             </a:fld>
             <a:endParaRPr lang="de-DE"/>
           </a:p>
@@ -593,7 +593,7 @@
           <a:p>
             <a:fld id="{E9C158C0-7942-4C90-83FA-4FE017085481}" type="datetimeFigureOut">
               <a:rPr lang="de-DE" smtClean="0"/>
-              <a:t>16.07.2018</a:t>
+              <a:t>17.07.2018</a:t>
             </a:fld>
             <a:endParaRPr lang="de-DE"/>
           </a:p>
@@ -763,7 +763,7 @@
           <a:p>
             <a:fld id="{E9C158C0-7942-4C90-83FA-4FE017085481}" type="datetimeFigureOut">
               <a:rPr lang="de-DE" smtClean="0"/>
-              <a:t>16.07.2018</a:t>
+              <a:t>17.07.2018</a:t>
             </a:fld>
             <a:endParaRPr lang="de-DE"/>
           </a:p>
@@ -1007,7 +1007,7 @@
           <a:p>
             <a:fld id="{E9C158C0-7942-4C90-83FA-4FE017085481}" type="datetimeFigureOut">
               <a:rPr lang="de-DE" smtClean="0"/>
-              <a:t>16.07.2018</a:t>
+              <a:t>17.07.2018</a:t>
             </a:fld>
             <a:endParaRPr lang="de-DE"/>
           </a:p>
@@ -1239,7 +1239,7 @@
           <a:p>
             <a:fld id="{E9C158C0-7942-4C90-83FA-4FE017085481}" type="datetimeFigureOut">
               <a:rPr lang="de-DE" smtClean="0"/>
-              <a:t>16.07.2018</a:t>
+              <a:t>17.07.2018</a:t>
             </a:fld>
             <a:endParaRPr lang="de-DE"/>
           </a:p>
@@ -1606,7 +1606,7 @@
           <a:p>
             <a:fld id="{E9C158C0-7942-4C90-83FA-4FE017085481}" type="datetimeFigureOut">
               <a:rPr lang="de-DE" smtClean="0"/>
-              <a:t>16.07.2018</a:t>
+              <a:t>17.07.2018</a:t>
             </a:fld>
             <a:endParaRPr lang="de-DE"/>
           </a:p>
@@ -1724,7 +1724,7 @@
           <a:p>
             <a:fld id="{E9C158C0-7942-4C90-83FA-4FE017085481}" type="datetimeFigureOut">
               <a:rPr lang="de-DE" smtClean="0"/>
-              <a:t>16.07.2018</a:t>
+              <a:t>17.07.2018</a:t>
             </a:fld>
             <a:endParaRPr lang="de-DE"/>
           </a:p>
@@ -1819,7 +1819,7 @@
           <a:p>
             <a:fld id="{E9C158C0-7942-4C90-83FA-4FE017085481}" type="datetimeFigureOut">
               <a:rPr lang="de-DE" smtClean="0"/>
-              <a:t>16.07.2018</a:t>
+              <a:t>17.07.2018</a:t>
             </a:fld>
             <a:endParaRPr lang="de-DE"/>
           </a:p>
@@ -2096,7 +2096,7 @@
           <a:p>
             <a:fld id="{E9C158C0-7942-4C90-83FA-4FE017085481}" type="datetimeFigureOut">
               <a:rPr lang="de-DE" smtClean="0"/>
-              <a:t>16.07.2018</a:t>
+              <a:t>17.07.2018</a:t>
             </a:fld>
             <a:endParaRPr lang="de-DE"/>
           </a:p>
@@ -2353,7 +2353,7 @@
           <a:p>
             <a:fld id="{E9C158C0-7942-4C90-83FA-4FE017085481}" type="datetimeFigureOut">
               <a:rPr lang="de-DE" smtClean="0"/>
-              <a:t>16.07.2018</a:t>
+              <a:t>17.07.2018</a:t>
             </a:fld>
             <a:endParaRPr lang="de-DE"/>
           </a:p>
@@ -2566,7 +2566,7 @@
           <a:p>
             <a:fld id="{E9C158C0-7942-4C90-83FA-4FE017085481}" type="datetimeFigureOut">
               <a:rPr lang="de-DE" smtClean="0"/>
-              <a:t>16.07.2018</a:t>
+              <a:t>17.07.2018</a:t>
             </a:fld>
             <a:endParaRPr lang="de-DE"/>
           </a:p>
@@ -2985,16 +2985,16 @@
         </p:nvSpPr>
         <p:spPr>
           <a:xfrm>
-            <a:off x="1269998" y="3782291"/>
-            <a:ext cx="3547532" cy="989493"/>
+            <a:off x="785081" y="3782291"/>
+            <a:ext cx="2775537" cy="989493"/>
           </a:xfrm>
           <a:prstGeom prst="rect">
             <a:avLst/>
           </a:prstGeom>
           <a:solidFill>
             <a:schemeClr val="accent2">
-              <a:lumMod val="60000"/>
-              <a:lumOff val="40000"/>
+              <a:lumMod val="20000"/>
+              <a:lumOff val="80000"/>
             </a:schemeClr>
           </a:solidFill>
         </p:spPr>
@@ -3015,7 +3015,7 @@
           </a:fontRef>
         </p:style>
         <p:txBody>
-          <a:bodyPr rot="0" spcFirstLastPara="0" vertOverflow="overflow" horzOverflow="overflow" vert="horz" wrap="square" lIns="41791" tIns="20896" rIns="41791" bIns="20896" numCol="1" spcCol="0" rtlCol="0" fromWordArt="0" anchor="t" anchorCtr="0" forceAA="0" compatLnSpc="1">
+          <a:bodyPr rot="0" spcFirstLastPara="0" vertOverflow="overflow" horzOverflow="overflow" vert="horz" wrap="square" lIns="41791" tIns="20896" rIns="41791" bIns="20896" numCol="1" spcCol="0" rtlCol="0" fromWordArt="0" anchor="ctr" anchorCtr="0" forceAA="0" compatLnSpc="1">
             <a:prstTxWarp prst="textNoShape">
               <a:avLst/>
             </a:prstTxWarp>
@@ -3023,15 +3023,16 @@
           </a:bodyPr>
           <a:lstStyle/>
           <a:p>
-            <a:r>
-              <a:rPr lang="de-DE" sz="1200" err="1">
+            <a:pPr algn="ctr"/>
+            <a:r>
+              <a:rPr lang="de-DE" sz="1600" err="1">
                 <a:solidFill>
                   <a:schemeClr val="tx1"/>
                 </a:solidFill>
               </a:rPr>
               <a:t>WorkThread</a:t>
             </a:r>
-            <a:endParaRPr lang="de-DE" sz="1200">
+            <a:endParaRPr lang="de-DE" sz="1600">
               <a:solidFill>
                 <a:schemeClr val="tx1"/>
               </a:solidFill>
@@ -3053,8 +3054,8 @@
         </p:nvSpPr>
         <p:spPr>
           <a:xfrm>
-            <a:off x="1270001" y="4771784"/>
-            <a:ext cx="3547532" cy="555087"/>
+            <a:off x="785084" y="4771784"/>
+            <a:ext cx="2775534" cy="555087"/>
           </a:xfrm>
           <a:prstGeom prst="rect">
             <a:avLst/>
@@ -3104,7 +3105,7 @@
                   <a:schemeClr val="tx1"/>
                 </a:solidFill>
               </a:rPr>
-              <a:t>                                 </a:t>
+              <a:t>                    </a:t>
             </a:r>
             <a:r>
               <a:rPr lang="de-DE" sz="1600">
@@ -3136,8 +3137,8 @@
         </p:nvSpPr>
         <p:spPr>
           <a:xfrm>
-            <a:off x="1269997" y="5326872"/>
-            <a:ext cx="3547531" cy="1251608"/>
+            <a:off x="785080" y="5326872"/>
+            <a:ext cx="2775535" cy="1251608"/>
           </a:xfrm>
           <a:prstGeom prst="rect">
             <a:avLst/>
@@ -3190,7 +3191,7 @@
                   <a:schemeClr val="tx1"/>
                 </a:solidFill>
               </a:rPr>
-              <a:t>                                 </a:t>
+              <a:t>                      </a:t>
             </a:r>
             <a:r>
               <a:rPr lang="de-DE" sz="1600">
@@ -3227,7 +3228,7 @@
                   <a:schemeClr val="tx1"/>
                 </a:solidFill>
               </a:rPr>
-              <a:t>		ModelData (Interface)</a:t>
+              <a:t>      ModelData (Interface)</a:t>
             </a:r>
           </a:p>
         </p:txBody>
@@ -3246,8 +3247,8 @@
         </p:nvSpPr>
         <p:spPr>
           <a:xfrm>
-            <a:off x="1269998" y="7110393"/>
-            <a:ext cx="3547532" cy="1891367"/>
+            <a:off x="785080" y="7350942"/>
+            <a:ext cx="4980719" cy="1715324"/>
           </a:xfrm>
           <a:prstGeom prst="rect">
             <a:avLst/>
@@ -3285,7 +3286,7 @@
                   <a:schemeClr val="tx1"/>
                 </a:solidFill>
               </a:rPr>
-              <a:t>EvolutionCore</a:t>
+              <a:t>                                              </a:t>
             </a:r>
           </a:p>
         </p:txBody>
@@ -3304,8 +3305,8 @@
         </p:nvSpPr>
         <p:spPr>
           <a:xfrm>
-            <a:off x="549276" y="640080"/>
-            <a:ext cx="5038724" cy="1424083"/>
+            <a:off x="549275" y="640080"/>
+            <a:ext cx="5216523" cy="1737047"/>
           </a:xfrm>
           <a:prstGeom prst="rect">
             <a:avLst/>
@@ -3361,7 +3362,7 @@
         </p:nvSpPr>
         <p:spPr>
           <a:xfrm>
-            <a:off x="5765800" y="470746"/>
+            <a:off x="5859145" y="472848"/>
             <a:ext cx="899160" cy="469053"/>
           </a:xfrm>
           <a:prstGeom prst="rect">
@@ -3809,8 +3810,8 @@
         </p:nvSpPr>
         <p:spPr>
           <a:xfrm>
-            <a:off x="549276" y="3269673"/>
-            <a:ext cx="5038723" cy="5996247"/>
+            <a:off x="549277" y="3269673"/>
+            <a:ext cx="3219160" cy="5996247"/>
           </a:xfrm>
           <a:prstGeom prst="rect">
             <a:avLst/>
@@ -3888,8 +3889,8 @@
         </p:nvSpPr>
         <p:spPr>
           <a:xfrm>
-            <a:off x="549276" y="2299855"/>
-            <a:ext cx="5038723" cy="688407"/>
+            <a:off x="785079" y="2576781"/>
+            <a:ext cx="2775534" cy="411481"/>
           </a:xfrm>
           <a:prstGeom prst="rect">
             <a:avLst/>
@@ -3918,18 +3919,19 @@
           </a:fontRef>
         </p:style>
         <p:txBody>
-          <a:bodyPr rtlCol="0" anchor="t"/>
-          <a:lstStyle/>
-          <a:p>
-            <a:r>
-              <a:rPr lang="de-DE" sz="1200" err="1">
+          <a:bodyPr rtlCol="0" anchor="ctr"/>
+          <a:lstStyle/>
+          <a:p>
+            <a:pPr algn="ctr"/>
+            <a:r>
+              <a:rPr lang="de-DE" sz="1600" err="1">
                 <a:solidFill>
                   <a:schemeClr val="tx1"/>
                 </a:solidFill>
               </a:rPr>
               <a:t>WorkThreadInterface</a:t>
             </a:r>
-            <a:endParaRPr lang="de-DE" sz="1200">
+            <a:endParaRPr lang="de-DE" sz="1600">
               <a:solidFill>
                 <a:schemeClr val="tx1"/>
               </a:solidFill>
@@ -3968,7 +3970,7 @@
         </p:blipFill>
         <p:spPr>
           <a:xfrm>
-            <a:off x="2667000" y="3335027"/>
+            <a:off x="1821869" y="3335027"/>
             <a:ext cx="630381" cy="447264"/>
           </a:xfrm>
           <a:prstGeom prst="rect">
@@ -3990,7 +3992,7 @@
         </p:nvSpPr>
         <p:spPr>
           <a:xfrm>
-            <a:off x="2822863" y="3021701"/>
+            <a:off x="1977732" y="3021701"/>
             <a:ext cx="318654" cy="318654"/>
           </a:xfrm>
           <a:prstGeom prst="downArrow">
@@ -4039,8 +4041,8 @@
         </p:nvSpPr>
         <p:spPr>
           <a:xfrm>
-            <a:off x="1269996" y="6596202"/>
-            <a:ext cx="3547532" cy="555087"/>
+            <a:off x="785079" y="6596202"/>
+            <a:ext cx="2775534" cy="555087"/>
           </a:xfrm>
           <a:prstGeom prst="rect">
             <a:avLst/>
@@ -4090,7 +4092,7 @@
                   <a:schemeClr val="tx1"/>
                 </a:solidFill>
               </a:rPr>
-              <a:t>                         </a:t>
+              <a:t>                       </a:t>
             </a:r>
             <a:r>
               <a:rPr lang="de-DE" sz="1600">
@@ -4098,13 +4100,186 @@
                   <a:schemeClr val="tx1"/>
                 </a:solidFill>
               </a:rPr>
-              <a:t>      EvoModelData</a:t>
+              <a:t>EvoModelData</a:t>
             </a:r>
             <a:endParaRPr lang="de-DE" sz="1200">
               <a:solidFill>
                 <a:schemeClr val="tx1"/>
               </a:solidFill>
             </a:endParaRPr>
+          </a:p>
+        </p:txBody>
+      </p:sp>
+      <p:sp>
+        <p:nvSpPr>
+          <p:cNvPr id="6" name="Rechteck 5">
+            <a:extLst>
+              <a:ext uri="{FF2B5EF4-FFF2-40B4-BE49-F238E27FC236}">
+                <a16:creationId xmlns:a16="http://schemas.microsoft.com/office/drawing/2014/main" id="{25292D47-FD85-4468-8501-AF083A2F46AA}"/>
+              </a:ext>
+            </a:extLst>
+          </p:cNvPr>
+          <p:cNvSpPr/>
+          <p:nvPr/>
+        </p:nvSpPr>
+        <p:spPr>
+          <a:xfrm>
+            <a:off x="3722418" y="7399260"/>
+            <a:ext cx="2068892" cy="469053"/>
+          </a:xfrm>
+          <a:prstGeom prst="rect">
+            <a:avLst/>
+          </a:prstGeom>
+          <a:noFill/>
+          <a:ln>
+            <a:noFill/>
+          </a:ln>
+        </p:spPr>
+        <p:style>
+          <a:lnRef idx="2">
+            <a:schemeClr val="accent1">
+              <a:shade val="50000"/>
+            </a:schemeClr>
+          </a:lnRef>
+          <a:fillRef idx="1">
+            <a:schemeClr val="accent1"/>
+          </a:fillRef>
+          <a:effectRef idx="0">
+            <a:schemeClr val="accent1"/>
+          </a:effectRef>
+          <a:fontRef idx="minor">
+            <a:schemeClr val="lt1"/>
+          </a:fontRef>
+        </p:style>
+        <p:txBody>
+          <a:bodyPr rtlCol="0" anchor="ctr"/>
+          <a:lstStyle/>
+          <a:p>
+            <a:pPr algn="ctr"/>
+            <a:r>
+              <a:rPr lang="de-DE" sz="1600">
+                <a:solidFill>
+                  <a:schemeClr val="tx1"/>
+                </a:solidFill>
+              </a:rPr>
+              <a:t>EvolutionModelData</a:t>
+            </a:r>
+          </a:p>
+        </p:txBody>
+      </p:sp>
+      <p:sp>
+        <p:nvSpPr>
+          <p:cNvPr id="23" name="Pfeil: nach unten 22">
+            <a:extLst>
+              <a:ext uri="{FF2B5EF4-FFF2-40B4-BE49-F238E27FC236}">
+                <a16:creationId xmlns:a16="http://schemas.microsoft.com/office/drawing/2014/main" id="{7A72D1A2-0991-4BFD-9932-7E7C2BB76B1D}"/>
+              </a:ext>
+            </a:extLst>
+          </p:cNvPr>
+          <p:cNvSpPr/>
+          <p:nvPr/>
+        </p:nvSpPr>
+        <p:spPr>
+          <a:xfrm>
+            <a:off x="4447309" y="2441333"/>
+            <a:ext cx="749583" cy="4709955"/>
+          </a:xfrm>
+          <a:prstGeom prst="downArrow">
+            <a:avLst/>
+          </a:prstGeom>
+          <a:solidFill>
+            <a:schemeClr val="accent1">
+              <a:lumMod val="20000"/>
+              <a:lumOff val="80000"/>
+            </a:schemeClr>
+          </a:solidFill>
+        </p:spPr>
+        <p:style>
+          <a:lnRef idx="2">
+            <a:schemeClr val="accent1">
+              <a:shade val="50000"/>
+            </a:schemeClr>
+          </a:lnRef>
+          <a:fillRef idx="1">
+            <a:schemeClr val="accent1"/>
+          </a:fillRef>
+          <a:effectRef idx="0">
+            <a:schemeClr val="accent1"/>
+          </a:effectRef>
+          <a:fontRef idx="minor">
+            <a:schemeClr val="lt1"/>
+          </a:fontRef>
+        </p:style>
+        <p:txBody>
+          <a:bodyPr vert="vert270" rtlCol="0" anchor="ctr"/>
+          <a:lstStyle/>
+          <a:p>
+            <a:pPr algn="ctr"/>
+            <a:r>
+              <a:rPr lang="de-DE">
+                <a:solidFill>
+                  <a:schemeClr val="tx1"/>
+                </a:solidFill>
+              </a:rPr>
+              <a:t>Read access</a:t>
+            </a:r>
+          </a:p>
+        </p:txBody>
+      </p:sp>
+      <p:sp>
+        <p:nvSpPr>
+          <p:cNvPr id="24" name="Rechteck 23">
+            <a:extLst>
+              <a:ext uri="{FF2B5EF4-FFF2-40B4-BE49-F238E27FC236}">
+                <a16:creationId xmlns:a16="http://schemas.microsoft.com/office/drawing/2014/main" id="{E15F2FF0-59A9-47BA-827D-74F074E95B8C}"/>
+              </a:ext>
+            </a:extLst>
+          </p:cNvPr>
+          <p:cNvSpPr/>
+          <p:nvPr/>
+        </p:nvSpPr>
+        <p:spPr>
+          <a:xfrm>
+            <a:off x="1261940" y="7350942"/>
+            <a:ext cx="2068892" cy="469053"/>
+          </a:xfrm>
+          <a:prstGeom prst="rect">
+            <a:avLst/>
+          </a:prstGeom>
+          <a:noFill/>
+          <a:ln>
+            <a:noFill/>
+          </a:ln>
+        </p:spPr>
+        <p:style>
+          <a:lnRef idx="2">
+            <a:schemeClr val="accent1">
+              <a:shade val="50000"/>
+            </a:schemeClr>
+          </a:lnRef>
+          <a:fillRef idx="1">
+            <a:schemeClr val="accent1"/>
+          </a:fillRef>
+          <a:effectRef idx="0">
+            <a:schemeClr val="accent1"/>
+          </a:effectRef>
+          <a:fontRef idx="minor">
+            <a:schemeClr val="lt1"/>
+          </a:fontRef>
+        </p:style>
+        <p:txBody>
+          <a:bodyPr rtlCol="0" anchor="ctr"/>
+          <a:lstStyle/>
+          <a:p>
+            <a:pPr algn="ctr"/>
+            <a:r>
+              <a:rPr lang="de-DE" sz="1600">
+                <a:solidFill>
+                  <a:schemeClr val="tx1"/>
+                </a:solidFill>
+              </a:rPr>
+              <a:t>EvolutionCore</a:t>
+            </a:r>
           </a:p>
         </p:txBody>
       </p:sp>

</xml_diff>

<commit_message>
Fixed bug in editor trackbars. Now running smoothly again.
</commit_message>
<xml_diff>
--- a/Evolution_Architecture.pptx
+++ b/Evolution_Architecture.pptx
@@ -197,7 +197,7 @@
           <a:p>
             <a:fld id="{B44CFCBC-DDDD-4E13-8051-469835F94031}" type="datetimeFigureOut">
               <a:rPr lang="de-DE" smtClean="0"/>
-              <a:t>26.07.2018</a:t>
+              <a:t>13.08.2018</a:t>
             </a:fld>
             <a:endParaRPr lang="de-DE"/>
           </a:p>
@@ -679,7 +679,7 @@
           <a:p>
             <a:fld id="{E9C158C0-7942-4C90-83FA-4FE017085481}" type="datetimeFigureOut">
               <a:rPr lang="de-DE" smtClean="0"/>
-              <a:t>26.07.2018</a:t>
+              <a:t>13.08.2018</a:t>
             </a:fld>
             <a:endParaRPr lang="de-DE"/>
           </a:p>
@@ -849,7 +849,7 @@
           <a:p>
             <a:fld id="{E9C158C0-7942-4C90-83FA-4FE017085481}" type="datetimeFigureOut">
               <a:rPr lang="de-DE" smtClean="0"/>
-              <a:t>26.07.2018</a:t>
+              <a:t>13.08.2018</a:t>
             </a:fld>
             <a:endParaRPr lang="de-DE"/>
           </a:p>
@@ -1029,7 +1029,7 @@
           <a:p>
             <a:fld id="{E9C158C0-7942-4C90-83FA-4FE017085481}" type="datetimeFigureOut">
               <a:rPr lang="de-DE" smtClean="0"/>
-              <a:t>26.07.2018</a:t>
+              <a:t>13.08.2018</a:t>
             </a:fld>
             <a:endParaRPr lang="de-DE"/>
           </a:p>
@@ -1199,7 +1199,7 @@
           <a:p>
             <a:fld id="{E9C158C0-7942-4C90-83FA-4FE017085481}" type="datetimeFigureOut">
               <a:rPr lang="de-DE" smtClean="0"/>
-              <a:t>26.07.2018</a:t>
+              <a:t>13.08.2018</a:t>
             </a:fld>
             <a:endParaRPr lang="de-DE"/>
           </a:p>
@@ -1443,7 +1443,7 @@
           <a:p>
             <a:fld id="{E9C158C0-7942-4C90-83FA-4FE017085481}" type="datetimeFigureOut">
               <a:rPr lang="de-DE" smtClean="0"/>
-              <a:t>26.07.2018</a:t>
+              <a:t>13.08.2018</a:t>
             </a:fld>
             <a:endParaRPr lang="de-DE"/>
           </a:p>
@@ -1675,7 +1675,7 @@
           <a:p>
             <a:fld id="{E9C158C0-7942-4C90-83FA-4FE017085481}" type="datetimeFigureOut">
               <a:rPr lang="de-DE" smtClean="0"/>
-              <a:t>26.07.2018</a:t>
+              <a:t>13.08.2018</a:t>
             </a:fld>
             <a:endParaRPr lang="de-DE"/>
           </a:p>
@@ -2042,7 +2042,7 @@
           <a:p>
             <a:fld id="{E9C158C0-7942-4C90-83FA-4FE017085481}" type="datetimeFigureOut">
               <a:rPr lang="de-DE" smtClean="0"/>
-              <a:t>26.07.2018</a:t>
+              <a:t>13.08.2018</a:t>
             </a:fld>
             <a:endParaRPr lang="de-DE"/>
           </a:p>
@@ -2160,7 +2160,7 @@
           <a:p>
             <a:fld id="{E9C158C0-7942-4C90-83FA-4FE017085481}" type="datetimeFigureOut">
               <a:rPr lang="de-DE" smtClean="0"/>
-              <a:t>26.07.2018</a:t>
+              <a:t>13.08.2018</a:t>
             </a:fld>
             <a:endParaRPr lang="de-DE"/>
           </a:p>
@@ -2255,7 +2255,7 @@
           <a:p>
             <a:fld id="{E9C158C0-7942-4C90-83FA-4FE017085481}" type="datetimeFigureOut">
               <a:rPr lang="de-DE" smtClean="0"/>
-              <a:t>26.07.2018</a:t>
+              <a:t>13.08.2018</a:t>
             </a:fld>
             <a:endParaRPr lang="de-DE"/>
           </a:p>
@@ -2532,7 +2532,7 @@
           <a:p>
             <a:fld id="{E9C158C0-7942-4C90-83FA-4FE017085481}" type="datetimeFigureOut">
               <a:rPr lang="de-DE" smtClean="0"/>
-              <a:t>26.07.2018</a:t>
+              <a:t>13.08.2018</a:t>
             </a:fld>
             <a:endParaRPr lang="de-DE"/>
           </a:p>
@@ -2789,7 +2789,7 @@
           <a:p>
             <a:fld id="{E9C158C0-7942-4C90-83FA-4FE017085481}" type="datetimeFigureOut">
               <a:rPr lang="de-DE" smtClean="0"/>
-              <a:t>26.07.2018</a:t>
+              <a:t>13.08.2018</a:t>
             </a:fld>
             <a:endParaRPr lang="de-DE"/>
           </a:p>
@@ -3002,7 +3002,7 @@
           <a:p>
             <a:fld id="{E9C158C0-7942-4C90-83FA-4FE017085481}" type="datetimeFigureOut">
               <a:rPr lang="de-DE" smtClean="0"/>
-              <a:t>26.07.2018</a:t>
+              <a:t>13.08.2018</a:t>
             </a:fld>
             <a:endParaRPr lang="de-DE"/>
           </a:p>

</xml_diff>

<commit_message>
work on 24 bit data, refactoring. Running stable.
</commit_message>
<xml_diff>
--- a/Evolution_Architecture.pptx
+++ b/Evolution_Architecture.pptx
@@ -197,7 +197,7 @@
           <a:p>
             <a:fld id="{B44CFCBC-DDDD-4E13-8051-469835F94031}" type="datetimeFigureOut">
               <a:rPr lang="de-DE" smtClean="0"/>
-              <a:t>13.08.2018</a:t>
+              <a:t>25.08.2018</a:t>
             </a:fld>
             <a:endParaRPr lang="de-DE"/>
           </a:p>
@@ -679,7 +679,7 @@
           <a:p>
             <a:fld id="{E9C158C0-7942-4C90-83FA-4FE017085481}" type="datetimeFigureOut">
               <a:rPr lang="de-DE" smtClean="0"/>
-              <a:t>13.08.2018</a:t>
+              <a:t>25.08.2018</a:t>
             </a:fld>
             <a:endParaRPr lang="de-DE"/>
           </a:p>
@@ -849,7 +849,7 @@
           <a:p>
             <a:fld id="{E9C158C0-7942-4C90-83FA-4FE017085481}" type="datetimeFigureOut">
               <a:rPr lang="de-DE" smtClean="0"/>
-              <a:t>13.08.2018</a:t>
+              <a:t>25.08.2018</a:t>
             </a:fld>
             <a:endParaRPr lang="de-DE"/>
           </a:p>
@@ -1029,7 +1029,7 @@
           <a:p>
             <a:fld id="{E9C158C0-7942-4C90-83FA-4FE017085481}" type="datetimeFigureOut">
               <a:rPr lang="de-DE" smtClean="0"/>
-              <a:t>13.08.2018</a:t>
+              <a:t>25.08.2018</a:t>
             </a:fld>
             <a:endParaRPr lang="de-DE"/>
           </a:p>
@@ -1199,7 +1199,7 @@
           <a:p>
             <a:fld id="{E9C158C0-7942-4C90-83FA-4FE017085481}" type="datetimeFigureOut">
               <a:rPr lang="de-DE" smtClean="0"/>
-              <a:t>13.08.2018</a:t>
+              <a:t>25.08.2018</a:t>
             </a:fld>
             <a:endParaRPr lang="de-DE"/>
           </a:p>
@@ -1443,7 +1443,7 @@
           <a:p>
             <a:fld id="{E9C158C0-7942-4C90-83FA-4FE017085481}" type="datetimeFigureOut">
               <a:rPr lang="de-DE" smtClean="0"/>
-              <a:t>13.08.2018</a:t>
+              <a:t>25.08.2018</a:t>
             </a:fld>
             <a:endParaRPr lang="de-DE"/>
           </a:p>
@@ -1675,7 +1675,7 @@
           <a:p>
             <a:fld id="{E9C158C0-7942-4C90-83FA-4FE017085481}" type="datetimeFigureOut">
               <a:rPr lang="de-DE" smtClean="0"/>
-              <a:t>13.08.2018</a:t>
+              <a:t>25.08.2018</a:t>
             </a:fld>
             <a:endParaRPr lang="de-DE"/>
           </a:p>
@@ -2042,7 +2042,7 @@
           <a:p>
             <a:fld id="{E9C158C0-7942-4C90-83FA-4FE017085481}" type="datetimeFigureOut">
               <a:rPr lang="de-DE" smtClean="0"/>
-              <a:t>13.08.2018</a:t>
+              <a:t>25.08.2018</a:t>
             </a:fld>
             <a:endParaRPr lang="de-DE"/>
           </a:p>
@@ -2160,7 +2160,7 @@
           <a:p>
             <a:fld id="{E9C158C0-7942-4C90-83FA-4FE017085481}" type="datetimeFigureOut">
               <a:rPr lang="de-DE" smtClean="0"/>
-              <a:t>13.08.2018</a:t>
+              <a:t>25.08.2018</a:t>
             </a:fld>
             <a:endParaRPr lang="de-DE"/>
           </a:p>
@@ -2255,7 +2255,7 @@
           <a:p>
             <a:fld id="{E9C158C0-7942-4C90-83FA-4FE017085481}" type="datetimeFigureOut">
               <a:rPr lang="de-DE" smtClean="0"/>
-              <a:t>13.08.2018</a:t>
+              <a:t>25.08.2018</a:t>
             </a:fld>
             <a:endParaRPr lang="de-DE"/>
           </a:p>
@@ -2532,7 +2532,7 @@
           <a:p>
             <a:fld id="{E9C158C0-7942-4C90-83FA-4FE017085481}" type="datetimeFigureOut">
               <a:rPr lang="de-DE" smtClean="0"/>
-              <a:t>13.08.2018</a:t>
+              <a:t>25.08.2018</a:t>
             </a:fld>
             <a:endParaRPr lang="de-DE"/>
           </a:p>
@@ -2789,7 +2789,7 @@
           <a:p>
             <a:fld id="{E9C158C0-7942-4C90-83FA-4FE017085481}" type="datetimeFigureOut">
               <a:rPr lang="de-DE" smtClean="0"/>
-              <a:t>13.08.2018</a:t>
+              <a:t>25.08.2018</a:t>
             </a:fld>
             <a:endParaRPr lang="de-DE"/>
           </a:p>
@@ -3002,7 +3002,7 @@
           <a:p>
             <a:fld id="{E9C158C0-7942-4C90-83FA-4FE017085481}" type="datetimeFigureOut">
               <a:rPr lang="de-DE" smtClean="0"/>
-              <a:t>13.08.2018</a:t>
+              <a:t>25.08.2018</a:t>
             </a:fld>
             <a:endParaRPr lang="de-DE"/>
           </a:p>
@@ -3715,7 +3715,7 @@
                   <a:schemeClr val="tx1"/>
                 </a:solidFill>
               </a:rPr>
-              <a:t>                    </a:t>
+              <a:t>                   </a:t>
             </a:r>
             <a:r>
               <a:rPr lang="de-DE" sz="1600">
@@ -3723,7 +3723,7 @@
                   <a:schemeClr val="tx1"/>
                 </a:solidFill>
               </a:rPr>
-              <a:t>EvoHistorySys</a:t>
+              <a:t>EvoHistorySysGlue</a:t>
             </a:r>
             <a:endParaRPr lang="de-DE" sz="1200">
               <a:solidFill>
@@ -4705,7 +4705,7 @@
                   <a:schemeClr val="tx1"/>
                 </a:solidFill>
               </a:rPr>
-              <a:t>                       </a:t>
+              <a:t>                 </a:t>
             </a:r>
             <a:r>
               <a:rPr lang="de-DE" sz="1600">
@@ -4713,7 +4713,7 @@
                   <a:schemeClr val="tx1"/>
                 </a:solidFill>
               </a:rPr>
-              <a:t>EvoModelData</a:t>
+              <a:t>EvoModelDataGlue</a:t>
             </a:r>
             <a:endParaRPr lang="de-DE" sz="1200">
               <a:solidFill>

</xml_diff>

<commit_message>
Refactoring, work on brush. Running.
</commit_message>
<xml_diff>
--- a/Evolution_Architecture.pptx
+++ b/Evolution_Architecture.pptx
@@ -197,7 +197,7 @@
           <a:p>
             <a:fld id="{B44CFCBC-DDDD-4E13-8051-469835F94031}" type="datetimeFigureOut">
               <a:rPr lang="de-DE" smtClean="0"/>
-              <a:t>25.08.2018</a:t>
+              <a:t>04.09.2018</a:t>
             </a:fld>
             <a:endParaRPr lang="de-DE"/>
           </a:p>
@@ -679,7 +679,7 @@
           <a:p>
             <a:fld id="{E9C158C0-7942-4C90-83FA-4FE017085481}" type="datetimeFigureOut">
               <a:rPr lang="de-DE" smtClean="0"/>
-              <a:t>25.08.2018</a:t>
+              <a:t>04.09.2018</a:t>
             </a:fld>
             <a:endParaRPr lang="de-DE"/>
           </a:p>
@@ -849,7 +849,7 @@
           <a:p>
             <a:fld id="{E9C158C0-7942-4C90-83FA-4FE017085481}" type="datetimeFigureOut">
               <a:rPr lang="de-DE" smtClean="0"/>
-              <a:t>25.08.2018</a:t>
+              <a:t>04.09.2018</a:t>
             </a:fld>
             <a:endParaRPr lang="de-DE"/>
           </a:p>
@@ -1029,7 +1029,7 @@
           <a:p>
             <a:fld id="{E9C158C0-7942-4C90-83FA-4FE017085481}" type="datetimeFigureOut">
               <a:rPr lang="de-DE" smtClean="0"/>
-              <a:t>25.08.2018</a:t>
+              <a:t>04.09.2018</a:t>
             </a:fld>
             <a:endParaRPr lang="de-DE"/>
           </a:p>
@@ -1199,7 +1199,7 @@
           <a:p>
             <a:fld id="{E9C158C0-7942-4C90-83FA-4FE017085481}" type="datetimeFigureOut">
               <a:rPr lang="de-DE" smtClean="0"/>
-              <a:t>25.08.2018</a:t>
+              <a:t>04.09.2018</a:t>
             </a:fld>
             <a:endParaRPr lang="de-DE"/>
           </a:p>
@@ -1443,7 +1443,7 @@
           <a:p>
             <a:fld id="{E9C158C0-7942-4C90-83FA-4FE017085481}" type="datetimeFigureOut">
               <a:rPr lang="de-DE" smtClean="0"/>
-              <a:t>25.08.2018</a:t>
+              <a:t>04.09.2018</a:t>
             </a:fld>
             <a:endParaRPr lang="de-DE"/>
           </a:p>
@@ -1675,7 +1675,7 @@
           <a:p>
             <a:fld id="{E9C158C0-7942-4C90-83FA-4FE017085481}" type="datetimeFigureOut">
               <a:rPr lang="de-DE" smtClean="0"/>
-              <a:t>25.08.2018</a:t>
+              <a:t>04.09.2018</a:t>
             </a:fld>
             <a:endParaRPr lang="de-DE"/>
           </a:p>
@@ -2042,7 +2042,7 @@
           <a:p>
             <a:fld id="{E9C158C0-7942-4C90-83FA-4FE017085481}" type="datetimeFigureOut">
               <a:rPr lang="de-DE" smtClean="0"/>
-              <a:t>25.08.2018</a:t>
+              <a:t>04.09.2018</a:t>
             </a:fld>
             <a:endParaRPr lang="de-DE"/>
           </a:p>
@@ -2160,7 +2160,7 @@
           <a:p>
             <a:fld id="{E9C158C0-7942-4C90-83FA-4FE017085481}" type="datetimeFigureOut">
               <a:rPr lang="de-DE" smtClean="0"/>
-              <a:t>25.08.2018</a:t>
+              <a:t>04.09.2018</a:t>
             </a:fld>
             <a:endParaRPr lang="de-DE"/>
           </a:p>
@@ -2255,7 +2255,7 @@
           <a:p>
             <a:fld id="{E9C158C0-7942-4C90-83FA-4FE017085481}" type="datetimeFigureOut">
               <a:rPr lang="de-DE" smtClean="0"/>
-              <a:t>25.08.2018</a:t>
+              <a:t>04.09.2018</a:t>
             </a:fld>
             <a:endParaRPr lang="de-DE"/>
           </a:p>
@@ -2532,7 +2532,7 @@
           <a:p>
             <a:fld id="{E9C158C0-7942-4C90-83FA-4FE017085481}" type="datetimeFigureOut">
               <a:rPr lang="de-DE" smtClean="0"/>
-              <a:t>25.08.2018</a:t>
+              <a:t>04.09.2018</a:t>
             </a:fld>
             <a:endParaRPr lang="de-DE"/>
           </a:p>
@@ -2789,7 +2789,7 @@
           <a:p>
             <a:fld id="{E9C158C0-7942-4C90-83FA-4FE017085481}" type="datetimeFigureOut">
               <a:rPr lang="de-DE" smtClean="0"/>
-              <a:t>25.08.2018</a:t>
+              <a:t>04.09.2018</a:t>
             </a:fld>
             <a:endParaRPr lang="de-DE"/>
           </a:p>
@@ -3002,7 +3002,7 @@
           <a:p>
             <a:fld id="{E9C158C0-7942-4C90-83FA-4FE017085481}" type="datetimeFigureOut">
               <a:rPr lang="de-DE" smtClean="0"/>
-              <a:t>25.08.2018</a:t>
+              <a:t>04.09.2018</a:t>
             </a:fld>
             <a:endParaRPr lang="de-DE"/>
           </a:p>
@@ -5186,7 +5186,7 @@
                   <a:schemeClr val="tx1"/>
                 </a:solidFill>
               </a:rPr>
-              <a:t>EditorState</a:t>
+              <a:t>GridBrush</a:t>
             </a:r>
           </a:p>
         </p:txBody>

</xml_diff>

<commit_message>
Shapelib: bug (missing text display) fixed. New bug found: Identical entries in bad guy list.
</commit_message>
<xml_diff>
--- a/Evolution_Architecture.pptx
+++ b/Evolution_Architecture.pptx
@@ -5,10 +5,11 @@
     <p:sldMasterId id="2147483672" r:id="rId1"/>
   </p:sldMasterIdLst>
   <p:notesMasterIdLst>
-    <p:notesMasterId r:id="rId3"/>
+    <p:notesMasterId r:id="rId4"/>
   </p:notesMasterIdLst>
   <p:sldIdLst>
     <p:sldId id="257" r:id="rId2"/>
+    <p:sldId id="258" r:id="rId3"/>
   </p:sldIdLst>
   <p:sldSz cx="6858000" cy="9906000" type="A4"/>
   <p:notesSz cx="6858000" cy="9144000"/>
@@ -197,7 +198,7 @@
           <a:p>
             <a:fld id="{B44CFCBC-DDDD-4E13-8051-469835F94031}" type="datetimeFigureOut">
               <a:rPr lang="de-DE" smtClean="0"/>
-              <a:t>09.09.2018</a:t>
+              <a:t>26.03.2019</a:t>
             </a:fld>
             <a:endParaRPr lang="de-DE"/>
           </a:p>
@@ -679,7 +680,7 @@
           <a:p>
             <a:fld id="{E9C158C0-7942-4C90-83FA-4FE017085481}" type="datetimeFigureOut">
               <a:rPr lang="de-DE" smtClean="0"/>
-              <a:t>09.09.2018</a:t>
+              <a:t>26.03.2019</a:t>
             </a:fld>
             <a:endParaRPr lang="de-DE"/>
           </a:p>
@@ -849,7 +850,7 @@
           <a:p>
             <a:fld id="{E9C158C0-7942-4C90-83FA-4FE017085481}" type="datetimeFigureOut">
               <a:rPr lang="de-DE" smtClean="0"/>
-              <a:t>09.09.2018</a:t>
+              <a:t>26.03.2019</a:t>
             </a:fld>
             <a:endParaRPr lang="de-DE"/>
           </a:p>
@@ -1029,7 +1030,7 @@
           <a:p>
             <a:fld id="{E9C158C0-7942-4C90-83FA-4FE017085481}" type="datetimeFigureOut">
               <a:rPr lang="de-DE" smtClean="0"/>
-              <a:t>09.09.2018</a:t>
+              <a:t>26.03.2019</a:t>
             </a:fld>
             <a:endParaRPr lang="de-DE"/>
           </a:p>
@@ -1199,7 +1200,7 @@
           <a:p>
             <a:fld id="{E9C158C0-7942-4C90-83FA-4FE017085481}" type="datetimeFigureOut">
               <a:rPr lang="de-DE" smtClean="0"/>
-              <a:t>09.09.2018</a:t>
+              <a:t>26.03.2019</a:t>
             </a:fld>
             <a:endParaRPr lang="de-DE"/>
           </a:p>
@@ -1443,7 +1444,7 @@
           <a:p>
             <a:fld id="{E9C158C0-7942-4C90-83FA-4FE017085481}" type="datetimeFigureOut">
               <a:rPr lang="de-DE" smtClean="0"/>
-              <a:t>09.09.2018</a:t>
+              <a:t>26.03.2019</a:t>
             </a:fld>
             <a:endParaRPr lang="de-DE"/>
           </a:p>
@@ -1675,7 +1676,7 @@
           <a:p>
             <a:fld id="{E9C158C0-7942-4C90-83FA-4FE017085481}" type="datetimeFigureOut">
               <a:rPr lang="de-DE" smtClean="0"/>
-              <a:t>09.09.2018</a:t>
+              <a:t>26.03.2019</a:t>
             </a:fld>
             <a:endParaRPr lang="de-DE"/>
           </a:p>
@@ -2042,7 +2043,7 @@
           <a:p>
             <a:fld id="{E9C158C0-7942-4C90-83FA-4FE017085481}" type="datetimeFigureOut">
               <a:rPr lang="de-DE" smtClean="0"/>
-              <a:t>09.09.2018</a:t>
+              <a:t>26.03.2019</a:t>
             </a:fld>
             <a:endParaRPr lang="de-DE"/>
           </a:p>
@@ -2160,7 +2161,7 @@
           <a:p>
             <a:fld id="{E9C158C0-7942-4C90-83FA-4FE017085481}" type="datetimeFigureOut">
               <a:rPr lang="de-DE" smtClean="0"/>
-              <a:t>09.09.2018</a:t>
+              <a:t>26.03.2019</a:t>
             </a:fld>
             <a:endParaRPr lang="de-DE"/>
           </a:p>
@@ -2255,7 +2256,7 @@
           <a:p>
             <a:fld id="{E9C158C0-7942-4C90-83FA-4FE017085481}" type="datetimeFigureOut">
               <a:rPr lang="de-DE" smtClean="0"/>
-              <a:t>09.09.2018</a:t>
+              <a:t>26.03.2019</a:t>
             </a:fld>
             <a:endParaRPr lang="de-DE"/>
           </a:p>
@@ -2532,7 +2533,7 @@
           <a:p>
             <a:fld id="{E9C158C0-7942-4C90-83FA-4FE017085481}" type="datetimeFigureOut">
               <a:rPr lang="de-DE" smtClean="0"/>
-              <a:t>09.09.2018</a:t>
+              <a:t>26.03.2019</a:t>
             </a:fld>
             <a:endParaRPr lang="de-DE"/>
           </a:p>
@@ -2789,7 +2790,7 @@
           <a:p>
             <a:fld id="{E9C158C0-7942-4C90-83FA-4FE017085481}" type="datetimeFigureOut">
               <a:rPr lang="de-DE" smtClean="0"/>
-              <a:t>09.09.2018</a:t>
+              <a:t>26.03.2019</a:t>
             </a:fld>
             <a:endParaRPr lang="de-DE"/>
           </a:p>
@@ -3002,7 +3003,7 @@
           <a:p>
             <a:fld id="{E9C158C0-7942-4C90-83FA-4FE017085481}" type="datetimeFigureOut">
               <a:rPr lang="de-DE" smtClean="0"/>
-              <a:t>09.09.2018</a:t>
+              <a:t>26.03.2019</a:t>
             </a:fld>
             <a:endParaRPr lang="de-DE"/>
           </a:p>
@@ -5021,6 +5022,919 @@
     <p:extLst>
       <p:ext uri="{BB962C8B-B14F-4D97-AF65-F5344CB8AC3E}">
         <p14:creationId xmlns:p14="http://schemas.microsoft.com/office/powerpoint/2010/main" val="1558153655"/>
+      </p:ext>
+    </p:extLst>
+  </p:cSld>
+  <p:clrMapOvr>
+    <a:masterClrMapping/>
+  </p:clrMapOvr>
+</p:sld>
+</file>
+
+<file path=ppt/slides/slide2.xml><?xml version="1.0" encoding="utf-8"?>
+<p:sld xmlns:a="http://schemas.openxmlformats.org/drawingml/2006/main" xmlns:r="http://schemas.openxmlformats.org/officeDocument/2006/relationships" xmlns:p="http://schemas.openxmlformats.org/presentationml/2006/main">
+  <p:cSld>
+    <p:spTree>
+      <p:nvGrpSpPr>
+        <p:cNvPr id="1" name=""/>
+        <p:cNvGrpSpPr/>
+        <p:nvPr/>
+      </p:nvGrpSpPr>
+      <p:grpSpPr>
+        <a:xfrm>
+          <a:off x="0" y="0"/>
+          <a:ext cx="0" cy="0"/>
+          <a:chOff x="0" y="0"/>
+          <a:chExt cx="0" cy="0"/>
+        </a:xfrm>
+      </p:grpSpPr>
+      <p:sp>
+        <p:nvSpPr>
+          <p:cNvPr id="2" name="Rechteck 1">
+            <a:extLst>
+              <a:ext uri="{FF2B5EF4-FFF2-40B4-BE49-F238E27FC236}">
+                <a16:creationId xmlns:a16="http://schemas.microsoft.com/office/drawing/2014/main" id="{123B2172-21DD-4666-9719-BB41C71C2C6C}"/>
+              </a:ext>
+            </a:extLst>
+          </p:cNvPr>
+          <p:cNvSpPr>
+            <a:spLocks/>
+          </p:cNvSpPr>
+          <p:nvPr/>
+        </p:nvSpPr>
+        <p:spPr>
+          <a:xfrm>
+            <a:off x="569498" y="3006436"/>
+            <a:ext cx="5760000" cy="5267862"/>
+          </a:xfrm>
+          <a:prstGeom prst="rect">
+            <a:avLst/>
+          </a:prstGeom>
+          <a:noFill/>
+          <a:ln w="57150">
+            <a:solidFill>
+              <a:srgbClr val="0070C0"/>
+            </a:solidFill>
+          </a:ln>
+        </p:spPr>
+        <p:style>
+          <a:lnRef idx="2">
+            <a:schemeClr val="accent1">
+              <a:shade val="50000"/>
+            </a:schemeClr>
+          </a:lnRef>
+          <a:fillRef idx="1">
+            <a:schemeClr val="accent1"/>
+          </a:fillRef>
+          <a:effectRef idx="0">
+            <a:schemeClr val="accent1"/>
+          </a:effectRef>
+          <a:fontRef idx="minor">
+            <a:schemeClr val="lt1"/>
+          </a:fontRef>
+        </p:style>
+        <p:txBody>
+          <a:bodyPr rtlCol="0" anchor="t"/>
+          <a:lstStyle/>
+          <a:p>
+            <a:r>
+              <a:rPr lang="de-DE">
+                <a:solidFill>
+                  <a:schemeClr val="tx1"/>
+                </a:solidFill>
+              </a:rPr>
+              <a:t>IndividualShape</a:t>
+            </a:r>
+          </a:p>
+        </p:txBody>
+      </p:sp>
+      <p:sp>
+        <p:nvSpPr>
+          <p:cNvPr id="4" name="Rechteck 3">
+            <a:extLst>
+              <a:ext uri="{FF2B5EF4-FFF2-40B4-BE49-F238E27FC236}">
+                <a16:creationId xmlns:a16="http://schemas.microsoft.com/office/drawing/2014/main" id="{BB922609-F20B-4654-9F49-F11C1D018EB7}"/>
+              </a:ext>
+            </a:extLst>
+          </p:cNvPr>
+          <p:cNvSpPr/>
+          <p:nvPr/>
+        </p:nvSpPr>
+        <p:spPr>
+          <a:xfrm>
+            <a:off x="3538504" y="3374244"/>
+            <a:ext cx="2640496" cy="4722835"/>
+          </a:xfrm>
+          <a:prstGeom prst="rect">
+            <a:avLst/>
+          </a:prstGeom>
+          <a:noFill/>
+          <a:ln w="57150">
+            <a:solidFill>
+              <a:schemeClr val="accent6">
+                <a:lumMod val="75000"/>
+              </a:schemeClr>
+            </a:solidFill>
+          </a:ln>
+        </p:spPr>
+        <p:style>
+          <a:lnRef idx="2">
+            <a:schemeClr val="accent1">
+              <a:shade val="50000"/>
+            </a:schemeClr>
+          </a:lnRef>
+          <a:fillRef idx="1">
+            <a:schemeClr val="accent1"/>
+          </a:fillRef>
+          <a:effectRef idx="0">
+            <a:schemeClr val="accent1"/>
+          </a:effectRef>
+          <a:fontRef idx="minor">
+            <a:schemeClr val="lt1"/>
+          </a:fontRef>
+        </p:style>
+        <p:txBody>
+          <a:bodyPr rtlCol="0" anchor="t"/>
+          <a:lstStyle/>
+          <a:p>
+            <a:r>
+              <a:rPr lang="de-DE">
+                <a:solidFill>
+                  <a:schemeClr val="tx1"/>
+                </a:solidFill>
+              </a:rPr>
+              <a:t>RightColumn</a:t>
+            </a:r>
+          </a:p>
+        </p:txBody>
+      </p:sp>
+      <p:sp>
+        <p:nvSpPr>
+          <p:cNvPr id="5" name="Rechteck 4">
+            <a:extLst>
+              <a:ext uri="{FF2B5EF4-FFF2-40B4-BE49-F238E27FC236}">
+                <a16:creationId xmlns:a16="http://schemas.microsoft.com/office/drawing/2014/main" id="{24C707CB-9A38-409D-BC80-FD17119E7295}"/>
+              </a:ext>
+            </a:extLst>
+          </p:cNvPr>
+          <p:cNvSpPr/>
+          <p:nvPr/>
+        </p:nvSpPr>
+        <p:spPr>
+          <a:xfrm>
+            <a:off x="733753" y="3374244"/>
+            <a:ext cx="2640496" cy="4736088"/>
+          </a:xfrm>
+          <a:prstGeom prst="rect">
+            <a:avLst/>
+          </a:prstGeom>
+          <a:noFill/>
+          <a:ln w="57150">
+            <a:solidFill>
+              <a:schemeClr val="accent6">
+                <a:lumMod val="75000"/>
+              </a:schemeClr>
+            </a:solidFill>
+          </a:ln>
+        </p:spPr>
+        <p:style>
+          <a:lnRef idx="2">
+            <a:schemeClr val="accent1">
+              <a:shade val="50000"/>
+            </a:schemeClr>
+          </a:lnRef>
+          <a:fillRef idx="1">
+            <a:schemeClr val="accent1"/>
+          </a:fillRef>
+          <a:effectRef idx="0">
+            <a:schemeClr val="accent1"/>
+          </a:effectRef>
+          <a:fontRef idx="minor">
+            <a:schemeClr val="lt1"/>
+          </a:fontRef>
+        </p:style>
+        <p:txBody>
+          <a:bodyPr rtlCol="0" anchor="t"/>
+          <a:lstStyle/>
+          <a:p>
+            <a:r>
+              <a:rPr lang="de-DE">
+                <a:solidFill>
+                  <a:schemeClr val="tx1"/>
+                </a:solidFill>
+              </a:rPr>
+              <a:t>LeftColumn</a:t>
+            </a:r>
+          </a:p>
+        </p:txBody>
+      </p:sp>
+      <p:sp>
+        <p:nvSpPr>
+          <p:cNvPr id="6" name="Rechteck 5">
+            <a:extLst>
+              <a:ext uri="{FF2B5EF4-FFF2-40B4-BE49-F238E27FC236}">
+                <a16:creationId xmlns:a16="http://schemas.microsoft.com/office/drawing/2014/main" id="{CA06FCAA-F666-4101-B665-05978C73D804}"/>
+              </a:ext>
+            </a:extLst>
+          </p:cNvPr>
+          <p:cNvSpPr>
+            <a:spLocks/>
+          </p:cNvSpPr>
+          <p:nvPr/>
+        </p:nvSpPr>
+        <p:spPr>
+          <a:xfrm>
+            <a:off x="397565" y="2345635"/>
+            <a:ext cx="6084333" cy="6081064"/>
+          </a:xfrm>
+          <a:prstGeom prst="rect">
+            <a:avLst/>
+          </a:prstGeom>
+          <a:noFill/>
+          <a:ln w="57150">
+            <a:solidFill>
+              <a:srgbClr val="C00000"/>
+            </a:solidFill>
+          </a:ln>
+        </p:spPr>
+        <p:style>
+          <a:lnRef idx="2">
+            <a:schemeClr val="accent1">
+              <a:shade val="50000"/>
+            </a:schemeClr>
+          </a:lnRef>
+          <a:fillRef idx="1">
+            <a:schemeClr val="accent1"/>
+          </a:fillRef>
+          <a:effectRef idx="0">
+            <a:schemeClr val="accent1"/>
+          </a:effectRef>
+          <a:fontRef idx="minor">
+            <a:schemeClr val="lt1"/>
+          </a:fontRef>
+        </p:style>
+        <p:txBody>
+          <a:bodyPr rtlCol="0" anchor="t"/>
+          <a:lstStyle/>
+          <a:p>
+            <a:pPr>
+              <a:tabLst>
+                <a:tab pos="5916613" algn="r"/>
+              </a:tabLst>
+            </a:pPr>
+            <a:r>
+              <a:rPr lang="de-DE">
+                <a:solidFill>
+                  <a:schemeClr val="tx1"/>
+                </a:solidFill>
+              </a:rPr>
+              <a:t>	GridPointShape</a:t>
+            </a:r>
+          </a:p>
+        </p:txBody>
+      </p:sp>
+      <p:sp>
+        <p:nvSpPr>
+          <p:cNvPr id="7" name="Rechteck 6">
+            <a:extLst>
+              <a:ext uri="{FF2B5EF4-FFF2-40B4-BE49-F238E27FC236}">
+                <a16:creationId xmlns:a16="http://schemas.microsoft.com/office/drawing/2014/main" id="{344FC875-DC52-44D3-A82C-D0F271E4F004}"/>
+              </a:ext>
+            </a:extLst>
+          </p:cNvPr>
+          <p:cNvSpPr/>
+          <p:nvPr/>
+        </p:nvSpPr>
+        <p:spPr>
+          <a:xfrm>
+            <a:off x="569498" y="2485627"/>
+            <a:ext cx="2254763" cy="387447"/>
+          </a:xfrm>
+          <a:prstGeom prst="rect">
+            <a:avLst/>
+          </a:prstGeom>
+          <a:noFill/>
+          <a:ln w="57150">
+            <a:solidFill>
+              <a:srgbClr val="0070C0"/>
+            </a:solidFill>
+          </a:ln>
+        </p:spPr>
+        <p:style>
+          <a:lnRef idx="2">
+            <a:schemeClr val="accent1">
+              <a:shade val="50000"/>
+            </a:schemeClr>
+          </a:lnRef>
+          <a:fillRef idx="1">
+            <a:schemeClr val="accent1"/>
+          </a:fillRef>
+          <a:effectRef idx="0">
+            <a:schemeClr val="accent1"/>
+          </a:effectRef>
+          <a:fontRef idx="minor">
+            <a:schemeClr val="lt1"/>
+          </a:fontRef>
+        </p:style>
+        <p:txBody>
+          <a:bodyPr rtlCol="0" anchor="t"/>
+          <a:lstStyle/>
+          <a:p>
+            <a:r>
+              <a:rPr lang="de-DE">
+                <a:solidFill>
+                  <a:schemeClr val="tx1"/>
+                </a:solidFill>
+              </a:rPr>
+              <a:t>CoordShape</a:t>
+            </a:r>
+          </a:p>
+        </p:txBody>
+      </p:sp>
+      <p:sp>
+        <p:nvSpPr>
+          <p:cNvPr id="8" name="Rechteck 7">
+            <a:extLst>
+              <a:ext uri="{FF2B5EF4-FFF2-40B4-BE49-F238E27FC236}">
+                <a16:creationId xmlns:a16="http://schemas.microsoft.com/office/drawing/2014/main" id="{A7EE368A-C94B-4C8F-810D-49BD4E91EFAD}"/>
+              </a:ext>
+            </a:extLst>
+          </p:cNvPr>
+          <p:cNvSpPr/>
+          <p:nvPr/>
+        </p:nvSpPr>
+        <p:spPr>
+          <a:xfrm>
+            <a:off x="888158" y="3774101"/>
+            <a:ext cx="2254763" cy="387447"/>
+          </a:xfrm>
+          <a:prstGeom prst="rect">
+            <a:avLst/>
+          </a:prstGeom>
+          <a:noFill/>
+          <a:ln w="57150">
+            <a:solidFill>
+              <a:srgbClr val="7030A0"/>
+            </a:solidFill>
+          </a:ln>
+        </p:spPr>
+        <p:style>
+          <a:lnRef idx="2">
+            <a:schemeClr val="accent1">
+              <a:shade val="50000"/>
+            </a:schemeClr>
+          </a:lnRef>
+          <a:fillRef idx="1">
+            <a:schemeClr val="accent1"/>
+          </a:fillRef>
+          <a:effectRef idx="0">
+            <a:schemeClr val="accent1"/>
+          </a:effectRef>
+          <a:fontRef idx="minor">
+            <a:schemeClr val="lt1"/>
+          </a:fontRef>
+        </p:style>
+        <p:txBody>
+          <a:bodyPr rtlCol="0" anchor="t"/>
+          <a:lstStyle/>
+          <a:p>
+            <a:r>
+              <a:rPr lang="de-DE">
+                <a:solidFill>
+                  <a:schemeClr val="tx1"/>
+                </a:solidFill>
+              </a:rPr>
+              <a:t>IdentifierShape</a:t>
+            </a:r>
+          </a:p>
+        </p:txBody>
+      </p:sp>
+      <p:sp>
+        <p:nvSpPr>
+          <p:cNvPr id="9" name="Rechteck 8">
+            <a:extLst>
+              <a:ext uri="{FF2B5EF4-FFF2-40B4-BE49-F238E27FC236}">
+                <a16:creationId xmlns:a16="http://schemas.microsoft.com/office/drawing/2014/main" id="{DCFCBCD9-49C3-42C5-A94B-EB324F4560E0}"/>
+              </a:ext>
+            </a:extLst>
+          </p:cNvPr>
+          <p:cNvSpPr/>
+          <p:nvPr/>
+        </p:nvSpPr>
+        <p:spPr>
+          <a:xfrm>
+            <a:off x="888158" y="4312511"/>
+            <a:ext cx="2254763" cy="3626144"/>
+          </a:xfrm>
+          <a:prstGeom prst="rect">
+            <a:avLst/>
+          </a:prstGeom>
+          <a:noFill/>
+          <a:ln w="57150">
+            <a:solidFill>
+              <a:srgbClr val="7030A0"/>
+            </a:solidFill>
+          </a:ln>
+        </p:spPr>
+        <p:style>
+          <a:lnRef idx="2">
+            <a:schemeClr val="accent1">
+              <a:shade val="50000"/>
+            </a:schemeClr>
+          </a:lnRef>
+          <a:fillRef idx="1">
+            <a:schemeClr val="accent1"/>
+          </a:fillRef>
+          <a:effectRef idx="0">
+            <a:schemeClr val="accent1"/>
+          </a:effectRef>
+          <a:fontRef idx="minor">
+            <a:schemeClr val="lt1"/>
+          </a:fontRef>
+        </p:style>
+        <p:txBody>
+          <a:bodyPr rtlCol="0" anchor="t"/>
+          <a:lstStyle/>
+          <a:p>
+            <a:r>
+              <a:rPr lang="de-DE">
+                <a:solidFill>
+                  <a:schemeClr val="tx1"/>
+                </a:solidFill>
+              </a:rPr>
+              <a:t>InfoShape</a:t>
+            </a:r>
+          </a:p>
+        </p:txBody>
+      </p:sp>
+      <p:sp>
+        <p:nvSpPr>
+          <p:cNvPr id="10" name="Rechteck 9">
+            <a:extLst>
+              <a:ext uri="{FF2B5EF4-FFF2-40B4-BE49-F238E27FC236}">
+                <a16:creationId xmlns:a16="http://schemas.microsoft.com/office/drawing/2014/main" id="{1FF38B72-B6A7-47C4-8962-424C6FB49FAF}"/>
+              </a:ext>
+            </a:extLst>
+          </p:cNvPr>
+          <p:cNvSpPr/>
+          <p:nvPr/>
+        </p:nvSpPr>
+        <p:spPr>
+          <a:xfrm>
+            <a:off x="3728330" y="3774096"/>
+            <a:ext cx="2254763" cy="387447"/>
+          </a:xfrm>
+          <a:prstGeom prst="rect">
+            <a:avLst/>
+          </a:prstGeom>
+          <a:noFill/>
+          <a:ln w="57150">
+            <a:solidFill>
+              <a:srgbClr val="7030A0"/>
+            </a:solidFill>
+          </a:ln>
+        </p:spPr>
+        <p:style>
+          <a:lnRef idx="2">
+            <a:schemeClr val="accent1">
+              <a:shade val="50000"/>
+            </a:schemeClr>
+          </a:lnRef>
+          <a:fillRef idx="1">
+            <a:schemeClr val="accent1"/>
+          </a:fillRef>
+          <a:effectRef idx="0">
+            <a:schemeClr val="accent1"/>
+          </a:effectRef>
+          <a:fontRef idx="minor">
+            <a:schemeClr val="lt1"/>
+          </a:fontRef>
+        </p:style>
+        <p:txBody>
+          <a:bodyPr rtlCol="0" anchor="t"/>
+          <a:lstStyle/>
+          <a:p>
+            <a:r>
+              <a:rPr lang="de-DE">
+                <a:solidFill>
+                  <a:schemeClr val="tx1"/>
+                </a:solidFill>
+              </a:rPr>
+              <a:t>MemorySlot</a:t>
+            </a:r>
+          </a:p>
+        </p:txBody>
+      </p:sp>
+      <p:sp>
+        <p:nvSpPr>
+          <p:cNvPr id="11" name="Rechteck 10">
+            <a:extLst>
+              <a:ext uri="{FF2B5EF4-FFF2-40B4-BE49-F238E27FC236}">
+                <a16:creationId xmlns:a16="http://schemas.microsoft.com/office/drawing/2014/main" id="{129470DD-1CAE-4D8E-96D3-674C03AD7B40}"/>
+              </a:ext>
+            </a:extLst>
+          </p:cNvPr>
+          <p:cNvSpPr/>
+          <p:nvPr/>
+        </p:nvSpPr>
+        <p:spPr>
+          <a:xfrm>
+            <a:off x="3728330" y="4312511"/>
+            <a:ext cx="2254763" cy="387447"/>
+          </a:xfrm>
+          <a:prstGeom prst="rect">
+            <a:avLst/>
+          </a:prstGeom>
+          <a:noFill/>
+          <a:ln w="57150">
+            <a:solidFill>
+              <a:srgbClr val="7030A0"/>
+            </a:solidFill>
+          </a:ln>
+        </p:spPr>
+        <p:style>
+          <a:lnRef idx="2">
+            <a:schemeClr val="accent1">
+              <a:shade val="50000"/>
+            </a:schemeClr>
+          </a:lnRef>
+          <a:fillRef idx="1">
+            <a:schemeClr val="accent1"/>
+          </a:fillRef>
+          <a:effectRef idx="0">
+            <a:schemeClr val="accent1"/>
+          </a:effectRef>
+          <a:fontRef idx="minor">
+            <a:schemeClr val="lt1"/>
+          </a:fontRef>
+        </p:style>
+        <p:txBody>
+          <a:bodyPr rtlCol="0" anchor="t"/>
+          <a:lstStyle/>
+          <a:p>
+            <a:r>
+              <a:rPr lang="de-DE">
+                <a:solidFill>
+                  <a:schemeClr val="tx1"/>
+                </a:solidFill>
+              </a:rPr>
+              <a:t>MemorySlot</a:t>
+            </a:r>
+          </a:p>
+        </p:txBody>
+      </p:sp>
+      <p:sp>
+        <p:nvSpPr>
+          <p:cNvPr id="12" name="Rechteck 11">
+            <a:extLst>
+              <a:ext uri="{FF2B5EF4-FFF2-40B4-BE49-F238E27FC236}">
+                <a16:creationId xmlns:a16="http://schemas.microsoft.com/office/drawing/2014/main" id="{FFD24471-0FFE-43BC-AEC8-7C990A6DF9BE}"/>
+              </a:ext>
+            </a:extLst>
+          </p:cNvPr>
+          <p:cNvSpPr/>
+          <p:nvPr/>
+        </p:nvSpPr>
+        <p:spPr>
+          <a:xfrm>
+            <a:off x="3728330" y="5389341"/>
+            <a:ext cx="2254763" cy="387447"/>
+          </a:xfrm>
+          <a:prstGeom prst="rect">
+            <a:avLst/>
+          </a:prstGeom>
+          <a:noFill/>
+          <a:ln w="57150">
+            <a:solidFill>
+              <a:srgbClr val="7030A0"/>
+            </a:solidFill>
+          </a:ln>
+        </p:spPr>
+        <p:style>
+          <a:lnRef idx="2">
+            <a:schemeClr val="accent1">
+              <a:shade val="50000"/>
+            </a:schemeClr>
+          </a:lnRef>
+          <a:fillRef idx="1">
+            <a:schemeClr val="accent1"/>
+          </a:fillRef>
+          <a:effectRef idx="0">
+            <a:schemeClr val="accent1"/>
+          </a:effectRef>
+          <a:fontRef idx="minor">
+            <a:schemeClr val="lt1"/>
+          </a:fontRef>
+        </p:style>
+        <p:txBody>
+          <a:bodyPr rtlCol="0" anchor="t"/>
+          <a:lstStyle/>
+          <a:p>
+            <a:r>
+              <a:rPr lang="de-DE">
+                <a:solidFill>
+                  <a:schemeClr val="tx1"/>
+                </a:solidFill>
+              </a:rPr>
+              <a:t>MemorySlot</a:t>
+            </a:r>
+          </a:p>
+        </p:txBody>
+      </p:sp>
+      <p:sp>
+        <p:nvSpPr>
+          <p:cNvPr id="13" name="Rechteck 12">
+            <a:extLst>
+              <a:ext uri="{FF2B5EF4-FFF2-40B4-BE49-F238E27FC236}">
+                <a16:creationId xmlns:a16="http://schemas.microsoft.com/office/drawing/2014/main" id="{FF9F5C09-CE7C-466A-868B-AC3512E74F46}"/>
+              </a:ext>
+            </a:extLst>
+          </p:cNvPr>
+          <p:cNvSpPr/>
+          <p:nvPr/>
+        </p:nvSpPr>
+        <p:spPr>
+          <a:xfrm>
+            <a:off x="3728330" y="5927756"/>
+            <a:ext cx="2254763" cy="387447"/>
+          </a:xfrm>
+          <a:prstGeom prst="rect">
+            <a:avLst/>
+          </a:prstGeom>
+          <a:noFill/>
+          <a:ln w="57150">
+            <a:solidFill>
+              <a:srgbClr val="7030A0"/>
+            </a:solidFill>
+          </a:ln>
+        </p:spPr>
+        <p:style>
+          <a:lnRef idx="2">
+            <a:schemeClr val="accent1">
+              <a:shade val="50000"/>
+            </a:schemeClr>
+          </a:lnRef>
+          <a:fillRef idx="1">
+            <a:schemeClr val="accent1"/>
+          </a:fillRef>
+          <a:effectRef idx="0">
+            <a:schemeClr val="accent1"/>
+          </a:effectRef>
+          <a:fontRef idx="minor">
+            <a:schemeClr val="lt1"/>
+          </a:fontRef>
+        </p:style>
+        <p:txBody>
+          <a:bodyPr rtlCol="0" anchor="t"/>
+          <a:lstStyle/>
+          <a:p>
+            <a:r>
+              <a:rPr lang="de-DE">
+                <a:solidFill>
+                  <a:schemeClr val="tx1"/>
+                </a:solidFill>
+              </a:rPr>
+              <a:t>MemorySlot</a:t>
+            </a:r>
+          </a:p>
+        </p:txBody>
+      </p:sp>
+      <p:sp>
+        <p:nvSpPr>
+          <p:cNvPr id="14" name="Rechteck 13">
+            <a:extLst>
+              <a:ext uri="{FF2B5EF4-FFF2-40B4-BE49-F238E27FC236}">
+                <a16:creationId xmlns:a16="http://schemas.microsoft.com/office/drawing/2014/main" id="{C1EA75A6-4BEA-40EE-A337-BE1F81F78497}"/>
+              </a:ext>
+            </a:extLst>
+          </p:cNvPr>
+          <p:cNvSpPr/>
+          <p:nvPr/>
+        </p:nvSpPr>
+        <p:spPr>
+          <a:xfrm>
+            <a:off x="3728330" y="6466171"/>
+            <a:ext cx="2254763" cy="387447"/>
+          </a:xfrm>
+          <a:prstGeom prst="rect">
+            <a:avLst/>
+          </a:prstGeom>
+          <a:noFill/>
+          <a:ln w="57150">
+            <a:solidFill>
+              <a:srgbClr val="7030A0"/>
+            </a:solidFill>
+          </a:ln>
+        </p:spPr>
+        <p:style>
+          <a:lnRef idx="2">
+            <a:schemeClr val="accent1">
+              <a:shade val="50000"/>
+            </a:schemeClr>
+          </a:lnRef>
+          <a:fillRef idx="1">
+            <a:schemeClr val="accent1"/>
+          </a:fillRef>
+          <a:effectRef idx="0">
+            <a:schemeClr val="accent1"/>
+          </a:effectRef>
+          <a:fontRef idx="minor">
+            <a:schemeClr val="lt1"/>
+          </a:fontRef>
+        </p:style>
+        <p:txBody>
+          <a:bodyPr rtlCol="0" anchor="t"/>
+          <a:lstStyle/>
+          <a:p>
+            <a:r>
+              <a:rPr lang="de-DE">
+                <a:solidFill>
+                  <a:schemeClr val="tx1"/>
+                </a:solidFill>
+              </a:rPr>
+              <a:t>MemorySlot</a:t>
+            </a:r>
+          </a:p>
+        </p:txBody>
+      </p:sp>
+      <p:sp>
+        <p:nvSpPr>
+          <p:cNvPr id="15" name="Rechteck 14">
+            <a:extLst>
+              <a:ext uri="{FF2B5EF4-FFF2-40B4-BE49-F238E27FC236}">
+                <a16:creationId xmlns:a16="http://schemas.microsoft.com/office/drawing/2014/main" id="{DE4547D2-5B47-4330-86AA-79A8B0FE29FC}"/>
+              </a:ext>
+            </a:extLst>
+          </p:cNvPr>
+          <p:cNvSpPr/>
+          <p:nvPr/>
+        </p:nvSpPr>
+        <p:spPr>
+          <a:xfrm>
+            <a:off x="3728330" y="7004586"/>
+            <a:ext cx="2254763" cy="387447"/>
+          </a:xfrm>
+          <a:prstGeom prst="rect">
+            <a:avLst/>
+          </a:prstGeom>
+          <a:noFill/>
+          <a:ln w="57150">
+            <a:solidFill>
+              <a:srgbClr val="7030A0"/>
+            </a:solidFill>
+          </a:ln>
+        </p:spPr>
+        <p:style>
+          <a:lnRef idx="2">
+            <a:schemeClr val="accent1">
+              <a:shade val="50000"/>
+            </a:schemeClr>
+          </a:lnRef>
+          <a:fillRef idx="1">
+            <a:schemeClr val="accent1"/>
+          </a:fillRef>
+          <a:effectRef idx="0">
+            <a:schemeClr val="accent1"/>
+          </a:effectRef>
+          <a:fontRef idx="minor">
+            <a:schemeClr val="lt1"/>
+          </a:fontRef>
+        </p:style>
+        <p:txBody>
+          <a:bodyPr rtlCol="0" anchor="t"/>
+          <a:lstStyle/>
+          <a:p>
+            <a:r>
+              <a:rPr lang="de-DE">
+                <a:solidFill>
+                  <a:schemeClr val="tx1"/>
+                </a:solidFill>
+              </a:rPr>
+              <a:t>MemorySlot</a:t>
+            </a:r>
+          </a:p>
+        </p:txBody>
+      </p:sp>
+      <p:sp>
+        <p:nvSpPr>
+          <p:cNvPr id="16" name="Rechteck 15">
+            <a:extLst>
+              <a:ext uri="{FF2B5EF4-FFF2-40B4-BE49-F238E27FC236}">
+                <a16:creationId xmlns:a16="http://schemas.microsoft.com/office/drawing/2014/main" id="{2FD32D83-E305-4B14-A263-ADE4A3F8F5C1}"/>
+              </a:ext>
+            </a:extLst>
+          </p:cNvPr>
+          <p:cNvSpPr/>
+          <p:nvPr/>
+        </p:nvSpPr>
+        <p:spPr>
+          <a:xfrm>
+            <a:off x="3728330" y="7543004"/>
+            <a:ext cx="2254763" cy="387447"/>
+          </a:xfrm>
+          <a:prstGeom prst="rect">
+            <a:avLst/>
+          </a:prstGeom>
+          <a:noFill/>
+          <a:ln w="57150">
+            <a:solidFill>
+              <a:srgbClr val="7030A0"/>
+            </a:solidFill>
+          </a:ln>
+        </p:spPr>
+        <p:style>
+          <a:lnRef idx="2">
+            <a:schemeClr val="accent1">
+              <a:shade val="50000"/>
+            </a:schemeClr>
+          </a:lnRef>
+          <a:fillRef idx="1">
+            <a:schemeClr val="accent1"/>
+          </a:fillRef>
+          <a:effectRef idx="0">
+            <a:schemeClr val="accent1"/>
+          </a:effectRef>
+          <a:fontRef idx="minor">
+            <a:schemeClr val="lt1"/>
+          </a:fontRef>
+        </p:style>
+        <p:txBody>
+          <a:bodyPr rtlCol="0" anchor="t"/>
+          <a:lstStyle/>
+          <a:p>
+            <a:r>
+              <a:rPr lang="de-DE">
+                <a:solidFill>
+                  <a:schemeClr val="tx1"/>
+                </a:solidFill>
+              </a:rPr>
+              <a:t>MemorySlot</a:t>
+            </a:r>
+          </a:p>
+        </p:txBody>
+      </p:sp>
+      <p:sp>
+        <p:nvSpPr>
+          <p:cNvPr id="17" name="Rechteck 16">
+            <a:extLst>
+              <a:ext uri="{FF2B5EF4-FFF2-40B4-BE49-F238E27FC236}">
+                <a16:creationId xmlns:a16="http://schemas.microsoft.com/office/drawing/2014/main" id="{6429B14E-E70D-404D-9CF9-062BE568B457}"/>
+              </a:ext>
+            </a:extLst>
+          </p:cNvPr>
+          <p:cNvSpPr/>
+          <p:nvPr/>
+        </p:nvSpPr>
+        <p:spPr>
+          <a:xfrm>
+            <a:off x="3728330" y="4850926"/>
+            <a:ext cx="2254763" cy="387447"/>
+          </a:xfrm>
+          <a:prstGeom prst="rect">
+            <a:avLst/>
+          </a:prstGeom>
+          <a:noFill/>
+          <a:ln w="57150">
+            <a:solidFill>
+              <a:srgbClr val="7030A0"/>
+            </a:solidFill>
+          </a:ln>
+        </p:spPr>
+        <p:style>
+          <a:lnRef idx="2">
+            <a:schemeClr val="accent1">
+              <a:shade val="50000"/>
+            </a:schemeClr>
+          </a:lnRef>
+          <a:fillRef idx="1">
+            <a:schemeClr val="accent1"/>
+          </a:fillRef>
+          <a:effectRef idx="0">
+            <a:schemeClr val="accent1"/>
+          </a:effectRef>
+          <a:fontRef idx="minor">
+            <a:schemeClr val="lt1"/>
+          </a:fontRef>
+        </p:style>
+        <p:txBody>
+          <a:bodyPr rtlCol="0" anchor="t"/>
+          <a:lstStyle/>
+          <a:p>
+            <a:r>
+              <a:rPr lang="de-DE">
+                <a:solidFill>
+                  <a:schemeClr val="tx1"/>
+                </a:solidFill>
+              </a:rPr>
+              <a:t>MemorySlot</a:t>
+            </a:r>
+          </a:p>
+        </p:txBody>
+      </p:sp>
+    </p:spTree>
+    <p:extLst>
+      <p:ext uri="{BB962C8B-B14F-4D97-AF65-F5344CB8AC3E}">
+        <p14:creationId xmlns:p14="http://schemas.microsoft.com/office/powerpoint/2010/main" val="1366590792"/>
       </p:ext>
     </p:extLst>
   </p:cSld>

</xml_diff>